<commit_message>
small correction (brackets missing on slide 11 and wrong polynomial degree on slide 13
</commit_message>
<xml_diff>
--- a/Slides/chapter2/chapter2_1.pptx
+++ b/Slides/chapter2/chapter2_1.pptx
@@ -210,13 +210,60 @@
 <file path=ppt/revisionInfo.xml><?xml version="1.0" encoding="utf-8"?>
 <p1510:revInfo xmlns:a="http://schemas.openxmlformats.org/drawingml/2006/main" xmlns:r="http://schemas.openxmlformats.org/officeDocument/2006/relationships" xmlns:p1510="http://schemas.microsoft.com/office/powerpoint/2015/10/main">
   <p1510:revLst>
-    <p1510:client id="{101CA44A-33ED-44ED-B039-616EC25DF3F7}" v="7" dt="2022-04-12T10:26:28.282"/>
+    <p1510:client id="{D544D981-56A6-497F-A59B-1312196E320A}" v="4" dt="2025-10-24T10:19:51.427"/>
   </p1510:revLst>
 </p1510:revInfo>
 </file>
 
 <file path=ppt/changesInfos/changesInfo1.xml><?xml version="1.0" encoding="utf-8"?>
 <pc:chgInfo xmlns:a="http://schemas.openxmlformats.org/drawingml/2006/main" xmlns:r="http://schemas.openxmlformats.org/officeDocument/2006/relationships" xmlns:ac="http://schemas.microsoft.com/office/drawing/2013/main/command" xmlns:pc="http://schemas.microsoft.com/office/powerpoint/2013/main/command">
+  <pc:docChgLst>
+    <pc:chgData name="Stefan Kollmannsberger" userId="2fc774831f44730f" providerId="LiveId" clId="{8BA96237-2DDF-4C1D-835D-A20BC3D66A10}"/>
+    <pc:docChg chg="modSld">
+      <pc:chgData name="Stefan Kollmannsberger" userId="2fc774831f44730f" providerId="LiveId" clId="{8BA96237-2DDF-4C1D-835D-A20BC3D66A10}" dt="2025-10-24T10:19:51.427" v="3" actId="20577"/>
+      <pc:docMkLst>
+        <pc:docMk/>
+      </pc:docMkLst>
+      <pc:sldChg chg="modSp modAnim">
+        <pc:chgData name="Stefan Kollmannsberger" userId="2fc774831f44730f" providerId="LiveId" clId="{8BA96237-2DDF-4C1D-835D-A20BC3D66A10}" dt="2025-10-24T10:19:31.836" v="1" actId="20577"/>
+        <pc:sldMkLst>
+          <pc:docMk/>
+          <pc:sldMk cId="3538339096" sldId="465"/>
+        </pc:sldMkLst>
+        <pc:spChg chg="mod">
+          <ac:chgData name="Stefan Kollmannsberger" userId="2fc774831f44730f" providerId="LiveId" clId="{8BA96237-2DDF-4C1D-835D-A20BC3D66A10}" dt="2025-10-24T10:19:31.836" v="1" actId="20577"/>
+          <ac:spMkLst>
+            <pc:docMk/>
+            <pc:sldMk cId="3538339096" sldId="465"/>
+            <ac:spMk id="2" creationId="{4595591B-0B17-47FC-DE6A-60DB3E71C2E7}"/>
+          </ac:spMkLst>
+        </pc:spChg>
+      </pc:sldChg>
+      <pc:sldChg chg="modSp">
+        <pc:chgData name="Stefan Kollmannsberger" userId="2fc774831f44730f" providerId="LiveId" clId="{8BA96237-2DDF-4C1D-835D-A20BC3D66A10}" dt="2025-10-24T10:19:51.427" v="3" actId="20577"/>
+        <pc:sldMkLst>
+          <pc:docMk/>
+          <pc:sldMk cId="3343102935" sldId="467"/>
+        </pc:sldMkLst>
+        <pc:spChg chg="mod">
+          <ac:chgData name="Stefan Kollmannsberger" userId="2fc774831f44730f" providerId="LiveId" clId="{8BA96237-2DDF-4C1D-835D-A20BC3D66A10}" dt="2025-10-24T10:19:48.515" v="2" actId="20577"/>
+          <ac:spMkLst>
+            <pc:docMk/>
+            <pc:sldMk cId="3343102935" sldId="467"/>
+            <ac:spMk id="10" creationId="{2EE0FF59-2E86-D3C4-4454-7494B21B4346}"/>
+          </ac:spMkLst>
+        </pc:spChg>
+        <pc:spChg chg="mod">
+          <ac:chgData name="Stefan Kollmannsberger" userId="2fc774831f44730f" providerId="LiveId" clId="{8BA96237-2DDF-4C1D-835D-A20BC3D66A10}" dt="2025-10-24T10:19:51.427" v="3" actId="20577"/>
+          <ac:spMkLst>
+            <pc:docMk/>
+            <pc:sldMk cId="3343102935" sldId="467"/>
+            <ac:spMk id="11" creationId="{E9F91897-987C-F757-1277-A76D8107BA8E}"/>
+          </ac:spMkLst>
+        </pc:spChg>
+      </pc:sldChg>
+    </pc:docChg>
+  </pc:docChgLst>
   <pc:docChgLst>
     <pc:chgData name="Kollmannsberger, Stefan" userId="33bc9b04-ebde-45a7-8cb5-2c13f1aad7eb" providerId="ADAL" clId="{101CA44A-33ED-44ED-B039-616EC25DF3F7}"/>
     <pc:docChg chg="undo redo custSel addSld delSld modSld sldOrd modMainMaster">
@@ -230,54 +277,6 @@
           <pc:docMk/>
           <pc:sldMk cId="2141348576" sldId="428"/>
         </pc:sldMkLst>
-        <pc:spChg chg="mod ord">
-          <ac:chgData name="Kollmannsberger, Stefan" userId="33bc9b04-ebde-45a7-8cb5-2c13f1aad7eb" providerId="ADAL" clId="{101CA44A-33ED-44ED-B039-616EC25DF3F7}" dt="2022-05-02T13:08:20.077" v="8617" actId="20577"/>
-          <ac:spMkLst>
-            <pc:docMk/>
-            <pc:sldMk cId="2141348576" sldId="428"/>
-            <ac:spMk id="2" creationId="{8D26780F-0988-438B-A234-333AC641C96E}"/>
-          </ac:spMkLst>
-        </pc:spChg>
-        <pc:spChg chg="mod ord">
-          <ac:chgData name="Kollmannsberger, Stefan" userId="33bc9b04-ebde-45a7-8cb5-2c13f1aad7eb" providerId="ADAL" clId="{101CA44A-33ED-44ED-B039-616EC25DF3F7}" dt="2022-04-12T08:45:29.846" v="295" actId="700"/>
-          <ac:spMkLst>
-            <pc:docMk/>
-            <pc:sldMk cId="2141348576" sldId="428"/>
-            <ac:spMk id="3" creationId="{B47C15A1-D146-4322-BEC6-A1F49E001BC2}"/>
-          </ac:spMkLst>
-        </pc:spChg>
-        <pc:spChg chg="mod ord">
-          <ac:chgData name="Kollmannsberger, Stefan" userId="33bc9b04-ebde-45a7-8cb5-2c13f1aad7eb" providerId="ADAL" clId="{101CA44A-33ED-44ED-B039-616EC25DF3F7}" dt="2022-04-12T08:45:29.846" v="295" actId="700"/>
-          <ac:spMkLst>
-            <pc:docMk/>
-            <pc:sldMk cId="2141348576" sldId="428"/>
-            <ac:spMk id="5" creationId="{E7FC2BD9-D45F-4312-A9A5-3A7CBA88F175}"/>
-          </ac:spMkLst>
-        </pc:spChg>
-        <pc:spChg chg="mod">
-          <ac:chgData name="Kollmannsberger, Stefan" userId="33bc9b04-ebde-45a7-8cb5-2c13f1aad7eb" providerId="ADAL" clId="{101CA44A-33ED-44ED-B039-616EC25DF3F7}" dt="2022-05-02T13:08:51.481" v="8621" actId="164"/>
-          <ac:spMkLst>
-            <pc:docMk/>
-            <pc:sldMk cId="2141348576" sldId="428"/>
-            <ac:spMk id="7" creationId="{00000000-0000-0000-0000-000000000000}"/>
-          </ac:spMkLst>
-        </pc:spChg>
-        <pc:grpChg chg="add mod">
-          <ac:chgData name="Kollmannsberger, Stefan" userId="33bc9b04-ebde-45a7-8cb5-2c13f1aad7eb" providerId="ADAL" clId="{101CA44A-33ED-44ED-B039-616EC25DF3F7}" dt="2022-05-02T13:08:51.481" v="8621" actId="164"/>
-          <ac:grpSpMkLst>
-            <pc:docMk/>
-            <pc:sldMk cId="2141348576" sldId="428"/>
-            <ac:grpSpMk id="4" creationId="{EEA4457D-B1EF-4B47-704B-C7D297A0D068}"/>
-          </ac:grpSpMkLst>
-        </pc:grpChg>
-        <pc:picChg chg="mod">
-          <ac:chgData name="Kollmannsberger, Stefan" userId="33bc9b04-ebde-45a7-8cb5-2c13f1aad7eb" providerId="ADAL" clId="{101CA44A-33ED-44ED-B039-616EC25DF3F7}" dt="2022-05-02T13:08:51.481" v="8621" actId="164"/>
-          <ac:picMkLst>
-            <pc:docMk/>
-            <pc:sldMk cId="2141348576" sldId="428"/>
-            <ac:picMk id="1026" creationId="{00000000-0000-0000-0000-000000000000}"/>
-          </ac:picMkLst>
-        </pc:picChg>
       </pc:sldChg>
       <pc:sldChg chg="modSp mod modAnim chgLayout">
         <pc:chgData name="Kollmannsberger, Stefan" userId="33bc9b04-ebde-45a7-8cb5-2c13f1aad7eb" providerId="ADAL" clId="{101CA44A-33ED-44ED-B039-616EC25DF3F7}" dt="2022-05-02T13:10:54.630" v="8630"/>
@@ -285,30 +284,6 @@
           <pc:docMk/>
           <pc:sldMk cId="2246344052" sldId="452"/>
         </pc:sldMkLst>
-        <pc:spChg chg="mod ord">
-          <ac:chgData name="Kollmannsberger, Stefan" userId="33bc9b04-ebde-45a7-8cb5-2c13f1aad7eb" providerId="ADAL" clId="{101CA44A-33ED-44ED-B039-616EC25DF3F7}" dt="2022-04-12T08:45:37.742" v="296" actId="700"/>
-          <ac:spMkLst>
-            <pc:docMk/>
-            <pc:sldMk cId="2246344052" sldId="452"/>
-            <ac:spMk id="2" creationId="{8D26780F-0988-438B-A234-333AC641C96E}"/>
-          </ac:spMkLst>
-        </pc:spChg>
-        <pc:spChg chg="mod ord">
-          <ac:chgData name="Kollmannsberger, Stefan" userId="33bc9b04-ebde-45a7-8cb5-2c13f1aad7eb" providerId="ADAL" clId="{101CA44A-33ED-44ED-B039-616EC25DF3F7}" dt="2022-04-12T08:45:37.742" v="296" actId="700"/>
-          <ac:spMkLst>
-            <pc:docMk/>
-            <pc:sldMk cId="2246344052" sldId="452"/>
-            <ac:spMk id="3" creationId="{B47C15A1-D146-4322-BEC6-A1F49E001BC2}"/>
-          </ac:spMkLst>
-        </pc:spChg>
-        <pc:spChg chg="mod ord">
-          <ac:chgData name="Kollmannsberger, Stefan" userId="33bc9b04-ebde-45a7-8cb5-2c13f1aad7eb" providerId="ADAL" clId="{101CA44A-33ED-44ED-B039-616EC25DF3F7}" dt="2022-04-12T08:45:37.742" v="296" actId="700"/>
-          <ac:spMkLst>
-            <pc:docMk/>
-            <pc:sldMk cId="2246344052" sldId="452"/>
-            <ac:spMk id="5" creationId="{E7FC2BD9-D45F-4312-A9A5-3A7CBA88F175}"/>
-          </ac:spMkLst>
-        </pc:spChg>
       </pc:sldChg>
       <pc:sldChg chg="addSp modSp mod modAnim chgLayout">
         <pc:chgData name="Kollmannsberger, Stefan" userId="33bc9b04-ebde-45a7-8cb5-2c13f1aad7eb" providerId="ADAL" clId="{101CA44A-33ED-44ED-B039-616EC25DF3F7}" dt="2022-05-02T13:12:19.812" v="8641"/>
@@ -316,54 +291,6 @@
           <pc:docMk/>
           <pc:sldMk cId="313371543" sldId="453"/>
         </pc:sldMkLst>
-        <pc:spChg chg="mod ord">
-          <ac:chgData name="Kollmannsberger, Stefan" userId="33bc9b04-ebde-45a7-8cb5-2c13f1aad7eb" providerId="ADAL" clId="{101CA44A-33ED-44ED-B039-616EC25DF3F7}" dt="2022-05-02T13:11:59.540" v="8638" actId="33524"/>
-          <ac:spMkLst>
-            <pc:docMk/>
-            <pc:sldMk cId="313371543" sldId="453"/>
-            <ac:spMk id="2" creationId="{8D26780F-0988-438B-A234-333AC641C96E}"/>
-          </ac:spMkLst>
-        </pc:spChg>
-        <pc:spChg chg="mod ord">
-          <ac:chgData name="Kollmannsberger, Stefan" userId="33bc9b04-ebde-45a7-8cb5-2c13f1aad7eb" providerId="ADAL" clId="{101CA44A-33ED-44ED-B039-616EC25DF3F7}" dt="2022-04-12T08:45:44.039" v="297" actId="700"/>
-          <ac:spMkLst>
-            <pc:docMk/>
-            <pc:sldMk cId="313371543" sldId="453"/>
-            <ac:spMk id="3" creationId="{B47C15A1-D146-4322-BEC6-A1F49E001BC2}"/>
-          </ac:spMkLst>
-        </pc:spChg>
-        <pc:spChg chg="mod ord">
-          <ac:chgData name="Kollmannsberger, Stefan" userId="33bc9b04-ebde-45a7-8cb5-2c13f1aad7eb" providerId="ADAL" clId="{101CA44A-33ED-44ED-B039-616EC25DF3F7}" dt="2022-04-12T08:45:44.039" v="297" actId="700"/>
-          <ac:spMkLst>
-            <pc:docMk/>
-            <pc:sldMk cId="313371543" sldId="453"/>
-            <ac:spMk id="5" creationId="{E7FC2BD9-D45F-4312-A9A5-3A7CBA88F175}"/>
-          </ac:spMkLst>
-        </pc:spChg>
-        <pc:spChg chg="add mod">
-          <ac:chgData name="Kollmannsberger, Stefan" userId="33bc9b04-ebde-45a7-8cb5-2c13f1aad7eb" providerId="ADAL" clId="{101CA44A-33ED-44ED-B039-616EC25DF3F7}" dt="2022-05-02T13:11:48.038" v="8637" actId="20577"/>
-          <ac:spMkLst>
-            <pc:docMk/>
-            <pc:sldMk cId="313371543" sldId="453"/>
-            <ac:spMk id="8" creationId="{7CB0A532-5A1E-462E-A4B2-3680C753FFCE}"/>
-          </ac:spMkLst>
-        </pc:spChg>
-        <pc:graphicFrameChg chg="mod">
-          <ac:chgData name="Kollmannsberger, Stefan" userId="33bc9b04-ebde-45a7-8cb5-2c13f1aad7eb" providerId="ADAL" clId="{101CA44A-33ED-44ED-B039-616EC25DF3F7}" dt="2022-04-12T10:44:19.269" v="1552" actId="1035"/>
-          <ac:graphicFrameMkLst>
-            <pc:docMk/>
-            <pc:sldMk cId="313371543" sldId="453"/>
-            <ac:graphicFrameMk id="4" creationId="{00000000-0000-0000-0000-000000000000}"/>
-          </ac:graphicFrameMkLst>
-        </pc:graphicFrameChg>
-        <pc:graphicFrameChg chg="mod">
-          <ac:chgData name="Kollmannsberger, Stefan" userId="33bc9b04-ebde-45a7-8cb5-2c13f1aad7eb" providerId="ADAL" clId="{101CA44A-33ED-44ED-B039-616EC25DF3F7}" dt="2022-05-02T13:11:18.175" v="8631" actId="1076"/>
-          <ac:graphicFrameMkLst>
-            <pc:docMk/>
-            <pc:sldMk cId="313371543" sldId="453"/>
-            <ac:graphicFrameMk id="7" creationId="{00000000-0000-0000-0000-000000000000}"/>
-          </ac:graphicFrameMkLst>
-        </pc:graphicFrameChg>
       </pc:sldChg>
       <pc:sldChg chg="addSp delSp modSp mod modAnim chgLayout">
         <pc:chgData name="Kollmannsberger, Stefan" userId="33bc9b04-ebde-45a7-8cb5-2c13f1aad7eb" providerId="ADAL" clId="{101CA44A-33ED-44ED-B039-616EC25DF3F7}" dt="2022-05-02T13:18:02.594" v="8729"/>
@@ -371,94 +298,6 @@
           <pc:docMk/>
           <pc:sldMk cId="2344004794" sldId="454"/>
         </pc:sldMkLst>
-        <pc:spChg chg="del mod ord">
-          <ac:chgData name="Kollmannsberger, Stefan" userId="33bc9b04-ebde-45a7-8cb5-2c13f1aad7eb" providerId="ADAL" clId="{101CA44A-33ED-44ED-B039-616EC25DF3F7}" dt="2022-04-12T13:31:26.772" v="4450" actId="478"/>
-          <ac:spMkLst>
-            <pc:docMk/>
-            <pc:sldMk cId="2344004794" sldId="454"/>
-            <ac:spMk id="2" creationId="{8D26780F-0988-438B-A234-333AC641C96E}"/>
-          </ac:spMkLst>
-        </pc:spChg>
-        <pc:spChg chg="mod ord">
-          <ac:chgData name="Kollmannsberger, Stefan" userId="33bc9b04-ebde-45a7-8cb5-2c13f1aad7eb" providerId="ADAL" clId="{101CA44A-33ED-44ED-B039-616EC25DF3F7}" dt="2022-04-12T12:42:48.786" v="2406" actId="20577"/>
-          <ac:spMkLst>
-            <pc:docMk/>
-            <pc:sldMk cId="2344004794" sldId="454"/>
-            <ac:spMk id="3" creationId="{B47C15A1-D146-4322-BEC6-A1F49E001BC2}"/>
-          </ac:spMkLst>
-        </pc:spChg>
-        <pc:spChg chg="mod ord">
-          <ac:chgData name="Kollmannsberger, Stefan" userId="33bc9b04-ebde-45a7-8cb5-2c13f1aad7eb" providerId="ADAL" clId="{101CA44A-33ED-44ED-B039-616EC25DF3F7}" dt="2022-04-12T08:47:28.140" v="351" actId="700"/>
-          <ac:spMkLst>
-            <pc:docMk/>
-            <pc:sldMk cId="2344004794" sldId="454"/>
-            <ac:spMk id="5" creationId="{E7FC2BD9-D45F-4312-A9A5-3A7CBA88F175}"/>
-          </ac:spMkLst>
-        </pc:spChg>
-        <pc:spChg chg="add del mod">
-          <ac:chgData name="Kollmannsberger, Stefan" userId="33bc9b04-ebde-45a7-8cb5-2c13f1aad7eb" providerId="ADAL" clId="{101CA44A-33ED-44ED-B039-616EC25DF3F7}" dt="2022-04-12T12:52:01.597" v="2500"/>
-          <ac:spMkLst>
-            <pc:docMk/>
-            <pc:sldMk cId="2344004794" sldId="454"/>
-            <ac:spMk id="7" creationId="{0F02EB60-7FD4-4CB9-882C-FA0B3102DFAD}"/>
-          </ac:spMkLst>
-        </pc:spChg>
-        <pc:spChg chg="add mod">
-          <ac:chgData name="Kollmannsberger, Stefan" userId="33bc9b04-ebde-45a7-8cb5-2c13f1aad7eb" providerId="ADAL" clId="{101CA44A-33ED-44ED-B039-616EC25DF3F7}" dt="2022-04-12T13:16:27.045" v="3963" actId="1038"/>
-          <ac:spMkLst>
-            <pc:docMk/>
-            <pc:sldMk cId="2344004794" sldId="454"/>
-            <ac:spMk id="8" creationId="{A14B764C-066C-4457-B3E1-D49132BE0FC1}"/>
-          </ac:spMkLst>
-        </pc:spChg>
-        <pc:spChg chg="add mod">
-          <ac:chgData name="Kollmannsberger, Stefan" userId="33bc9b04-ebde-45a7-8cb5-2c13f1aad7eb" providerId="ADAL" clId="{101CA44A-33ED-44ED-B039-616EC25DF3F7}" dt="2022-05-02T13:03:56.528" v="8578" actId="1076"/>
-          <ac:spMkLst>
-            <pc:docMk/>
-            <pc:sldMk cId="2344004794" sldId="454"/>
-            <ac:spMk id="9" creationId="{9A4A54E0-6C80-ABA3-1393-44F8617DFD94}"/>
-          </ac:spMkLst>
-        </pc:spChg>
-        <pc:spChg chg="add del mod">
-          <ac:chgData name="Kollmannsberger, Stefan" userId="33bc9b04-ebde-45a7-8cb5-2c13f1aad7eb" providerId="ADAL" clId="{101CA44A-33ED-44ED-B039-616EC25DF3F7}" dt="2022-04-12T13:31:28.316" v="4451" actId="478"/>
-          <ac:spMkLst>
-            <pc:docMk/>
-            <pc:sldMk cId="2344004794" sldId="454"/>
-            <ac:spMk id="10" creationId="{9D87B0C6-B7A4-4473-B661-AD576D31C28C}"/>
-          </ac:spMkLst>
-        </pc:spChg>
-        <pc:spChg chg="add mod">
-          <ac:chgData name="Kollmannsberger, Stefan" userId="33bc9b04-ebde-45a7-8cb5-2c13f1aad7eb" providerId="ADAL" clId="{101CA44A-33ED-44ED-B039-616EC25DF3F7}" dt="2022-05-02T13:03:56.528" v="8578" actId="1076"/>
-          <ac:spMkLst>
-            <pc:docMk/>
-            <pc:sldMk cId="2344004794" sldId="454"/>
-            <ac:spMk id="11" creationId="{472FF738-2B66-4865-AA29-8FA3DFEB34CC}"/>
-          </ac:spMkLst>
-        </pc:spChg>
-        <pc:grpChg chg="add mod">
-          <ac:chgData name="Kollmannsberger, Stefan" userId="33bc9b04-ebde-45a7-8cb5-2c13f1aad7eb" providerId="ADAL" clId="{101CA44A-33ED-44ED-B039-616EC25DF3F7}" dt="2022-05-02T13:03:56.528" v="8578" actId="1076"/>
-          <ac:grpSpMkLst>
-            <pc:docMk/>
-            <pc:sldMk cId="2344004794" sldId="454"/>
-            <ac:grpSpMk id="2" creationId="{5C47226D-BBE1-F02C-16F6-980765C0FDD1}"/>
-          </ac:grpSpMkLst>
-        </pc:grpChg>
-        <pc:graphicFrameChg chg="mod">
-          <ac:chgData name="Kollmannsberger, Stefan" userId="33bc9b04-ebde-45a7-8cb5-2c13f1aad7eb" providerId="ADAL" clId="{101CA44A-33ED-44ED-B039-616EC25DF3F7}" dt="2022-05-02T13:03:41.336" v="8576" actId="14100"/>
-          <ac:graphicFrameMkLst>
-            <pc:docMk/>
-            <pc:sldMk cId="2344004794" sldId="454"/>
-            <ac:graphicFrameMk id="6" creationId="{00000000-0000-0000-0000-000000000000}"/>
-          </ac:graphicFrameMkLst>
-        </pc:graphicFrameChg>
-        <pc:picChg chg="add mod">
-          <ac:chgData name="Kollmannsberger, Stefan" userId="33bc9b04-ebde-45a7-8cb5-2c13f1aad7eb" providerId="ADAL" clId="{101CA44A-33ED-44ED-B039-616EC25DF3F7}" dt="2022-05-02T13:03:56.528" v="8578" actId="1076"/>
-          <ac:picMkLst>
-            <pc:docMk/>
-            <pc:sldMk cId="2344004794" sldId="454"/>
-            <ac:picMk id="4100" creationId="{47AF51EF-72A5-3D86-303E-54E8163B880B}"/>
-          </ac:picMkLst>
-        </pc:picChg>
       </pc:sldChg>
       <pc:sldChg chg="addSp delSp modSp mod modAnim chgLayout modNotesTx">
         <pc:chgData name="Kollmannsberger, Stefan" userId="33bc9b04-ebde-45a7-8cb5-2c13f1aad7eb" providerId="ADAL" clId="{101CA44A-33ED-44ED-B039-616EC25DF3F7}" dt="2022-05-02T13:27:23.696" v="8901" actId="313"/>
@@ -466,86 +305,6 @@
           <pc:docMk/>
           <pc:sldMk cId="267222439" sldId="455"/>
         </pc:sldMkLst>
-        <pc:spChg chg="mod ord">
-          <ac:chgData name="Kollmannsberger, Stefan" userId="33bc9b04-ebde-45a7-8cb5-2c13f1aad7eb" providerId="ADAL" clId="{101CA44A-33ED-44ED-B039-616EC25DF3F7}" dt="2022-04-12T13:22:03.084" v="4316" actId="20577"/>
-          <ac:spMkLst>
-            <pc:docMk/>
-            <pc:sldMk cId="267222439" sldId="455"/>
-            <ac:spMk id="2" creationId="{00000000-0000-0000-0000-000000000000}"/>
-          </ac:spMkLst>
-        </pc:spChg>
-        <pc:spChg chg="mod ord">
-          <ac:chgData name="Kollmannsberger, Stefan" userId="33bc9b04-ebde-45a7-8cb5-2c13f1aad7eb" providerId="ADAL" clId="{101CA44A-33ED-44ED-B039-616EC25DF3F7}" dt="2022-04-30T13:49:22.558" v="5038" actId="207"/>
-          <ac:spMkLst>
-            <pc:docMk/>
-            <pc:sldMk cId="267222439" sldId="455"/>
-            <ac:spMk id="3" creationId="{00000000-0000-0000-0000-000000000000}"/>
-          </ac:spMkLst>
-        </pc:spChg>
-        <pc:spChg chg="mod ord">
-          <ac:chgData name="Kollmannsberger, Stefan" userId="33bc9b04-ebde-45a7-8cb5-2c13f1aad7eb" providerId="ADAL" clId="{101CA44A-33ED-44ED-B039-616EC25DF3F7}" dt="2022-04-12T13:12:09.960" v="3600" actId="700"/>
-          <ac:spMkLst>
-            <pc:docMk/>
-            <pc:sldMk cId="267222439" sldId="455"/>
-            <ac:spMk id="4" creationId="{00000000-0000-0000-0000-000000000000}"/>
-          </ac:spMkLst>
-        </pc:spChg>
-        <pc:spChg chg="del mod">
-          <ac:chgData name="Kollmannsberger, Stefan" userId="33bc9b04-ebde-45a7-8cb5-2c13f1aad7eb" providerId="ADAL" clId="{101CA44A-33ED-44ED-B039-616EC25DF3F7}" dt="2022-04-12T13:20:05.936" v="4169" actId="478"/>
-          <ac:spMkLst>
-            <pc:docMk/>
-            <pc:sldMk cId="267222439" sldId="455"/>
-            <ac:spMk id="6" creationId="{00000000-0000-0000-0000-000000000000}"/>
-          </ac:spMkLst>
-        </pc:spChg>
-        <pc:spChg chg="add mod">
-          <ac:chgData name="Kollmannsberger, Stefan" userId="33bc9b04-ebde-45a7-8cb5-2c13f1aad7eb" providerId="ADAL" clId="{101CA44A-33ED-44ED-B039-616EC25DF3F7}" dt="2022-04-12T13:19:40.689" v="4167" actId="1036"/>
-          <ac:spMkLst>
-            <pc:docMk/>
-            <pc:sldMk cId="267222439" sldId="455"/>
-            <ac:spMk id="7" creationId="{E0B12FCF-C821-42E7-B543-AFF1C08C88E0}"/>
-          </ac:spMkLst>
-        </pc:spChg>
-        <pc:spChg chg="add mod">
-          <ac:chgData name="Kollmannsberger, Stefan" userId="33bc9b04-ebde-45a7-8cb5-2c13f1aad7eb" providerId="ADAL" clId="{101CA44A-33ED-44ED-B039-616EC25DF3F7}" dt="2022-04-30T14:05:09.411" v="5454" actId="1076"/>
-          <ac:spMkLst>
-            <pc:docMk/>
-            <pc:sldMk cId="267222439" sldId="455"/>
-            <ac:spMk id="8" creationId="{FD5D0DED-6C52-42F9-AA45-30E40EE807CB}"/>
-          </ac:spMkLst>
-        </pc:spChg>
-        <pc:graphicFrameChg chg="del mod">
-          <ac:chgData name="Kollmannsberger, Stefan" userId="33bc9b04-ebde-45a7-8cb5-2c13f1aad7eb" providerId="ADAL" clId="{101CA44A-33ED-44ED-B039-616EC25DF3F7}" dt="2022-04-12T13:24:57.463" v="4415" actId="478"/>
-          <ac:graphicFrameMkLst>
-            <pc:docMk/>
-            <pc:sldMk cId="267222439" sldId="455"/>
-            <ac:graphicFrameMk id="5" creationId="{00000000-0000-0000-0000-000000000000}"/>
-          </ac:graphicFrameMkLst>
-        </pc:graphicFrameChg>
-        <pc:picChg chg="add mod ord">
-          <ac:chgData name="Kollmannsberger, Stefan" userId="33bc9b04-ebde-45a7-8cb5-2c13f1aad7eb" providerId="ADAL" clId="{101CA44A-33ED-44ED-B039-616EC25DF3F7}" dt="2022-04-30T14:04:38.240" v="5427" actId="1076"/>
-          <ac:picMkLst>
-            <pc:docMk/>
-            <pc:sldMk cId="267222439" sldId="455"/>
-            <ac:picMk id="9" creationId="{017E02A7-A8F2-4A5C-8595-BFE9F2DDA3CF}"/>
-          </ac:picMkLst>
-        </pc:picChg>
-        <pc:picChg chg="add del">
-          <ac:chgData name="Kollmannsberger, Stefan" userId="33bc9b04-ebde-45a7-8cb5-2c13f1aad7eb" providerId="ADAL" clId="{101CA44A-33ED-44ED-B039-616EC25DF3F7}" dt="2022-04-12T13:25:58.394" v="4423" actId="22"/>
-          <ac:picMkLst>
-            <pc:docMk/>
-            <pc:sldMk cId="267222439" sldId="455"/>
-            <ac:picMk id="11" creationId="{8A0F2119-5425-4A5D-8F85-883687AC51D3}"/>
-          </ac:picMkLst>
-        </pc:picChg>
-        <pc:picChg chg="add del">
-          <ac:chgData name="Kollmannsberger, Stefan" userId="33bc9b04-ebde-45a7-8cb5-2c13f1aad7eb" providerId="ADAL" clId="{101CA44A-33ED-44ED-B039-616EC25DF3F7}" dt="2022-04-12T13:26:03.019" v="4425" actId="22"/>
-          <ac:picMkLst>
-            <pc:docMk/>
-            <pc:sldMk cId="267222439" sldId="455"/>
-            <ac:picMk id="13" creationId="{5F2128FD-C203-4E84-AFE5-09AC983C6210}"/>
-          </ac:picMkLst>
-        </pc:picChg>
       </pc:sldChg>
       <pc:sldChg chg="addSp delSp modSp mod modAnim chgLayout">
         <pc:chgData name="Kollmannsberger, Stefan" userId="33bc9b04-ebde-45a7-8cb5-2c13f1aad7eb" providerId="ADAL" clId="{101CA44A-33ED-44ED-B039-616EC25DF3F7}" dt="2022-05-02T13:27:49.795" v="8902"/>
@@ -553,78 +312,6 @@
           <pc:docMk/>
           <pc:sldMk cId="657115825" sldId="456"/>
         </pc:sldMkLst>
-        <pc:spChg chg="mod ord">
-          <ac:chgData name="Kollmannsberger, Stefan" userId="33bc9b04-ebde-45a7-8cb5-2c13f1aad7eb" providerId="ADAL" clId="{101CA44A-33ED-44ED-B039-616EC25DF3F7}" dt="2022-04-30T14:08:29.493" v="5584" actId="20577"/>
-          <ac:spMkLst>
-            <pc:docMk/>
-            <pc:sldMk cId="657115825" sldId="456"/>
-            <ac:spMk id="2" creationId="{00000000-0000-0000-0000-000000000000}"/>
-          </ac:spMkLst>
-        </pc:spChg>
-        <pc:spChg chg="mod ord">
-          <ac:chgData name="Kollmannsberger, Stefan" userId="33bc9b04-ebde-45a7-8cb5-2c13f1aad7eb" providerId="ADAL" clId="{101CA44A-33ED-44ED-B039-616EC25DF3F7}" dt="2022-04-30T14:05:39.144" v="5460" actId="20577"/>
-          <ac:spMkLst>
-            <pc:docMk/>
-            <pc:sldMk cId="657115825" sldId="456"/>
-            <ac:spMk id="3" creationId="{00000000-0000-0000-0000-000000000000}"/>
-          </ac:spMkLst>
-        </pc:spChg>
-        <pc:spChg chg="mod ord">
-          <ac:chgData name="Kollmannsberger, Stefan" userId="33bc9b04-ebde-45a7-8cb5-2c13f1aad7eb" providerId="ADAL" clId="{101CA44A-33ED-44ED-B039-616EC25DF3F7}" dt="2022-04-12T13:30:22.722" v="4434" actId="700"/>
-          <ac:spMkLst>
-            <pc:docMk/>
-            <pc:sldMk cId="657115825" sldId="456"/>
-            <ac:spMk id="4" creationId="{00000000-0000-0000-0000-000000000000}"/>
-          </ac:spMkLst>
-        </pc:spChg>
-        <pc:spChg chg="del mod">
-          <ac:chgData name="Kollmannsberger, Stefan" userId="33bc9b04-ebde-45a7-8cb5-2c13f1aad7eb" providerId="ADAL" clId="{101CA44A-33ED-44ED-B039-616EC25DF3F7}" dt="2022-04-12T13:35:08.500" v="4543" actId="478"/>
-          <ac:spMkLst>
-            <pc:docMk/>
-            <pc:sldMk cId="657115825" sldId="456"/>
-            <ac:spMk id="6" creationId="{00000000-0000-0000-0000-000000000000}"/>
-          </ac:spMkLst>
-        </pc:spChg>
-        <pc:spChg chg="add mod">
-          <ac:chgData name="Kollmannsberger, Stefan" userId="33bc9b04-ebde-45a7-8cb5-2c13f1aad7eb" providerId="ADAL" clId="{101CA44A-33ED-44ED-B039-616EC25DF3F7}" dt="2022-04-30T14:17:54.696" v="5800" actId="14100"/>
-          <ac:spMkLst>
-            <pc:docMk/>
-            <pc:sldMk cId="657115825" sldId="456"/>
-            <ac:spMk id="14" creationId="{EDC2EA70-6F99-4FD8-99F3-4CC99F63E76E}"/>
-          </ac:spMkLst>
-        </pc:spChg>
-        <pc:picChg chg="add mod ord">
-          <ac:chgData name="Kollmannsberger, Stefan" userId="33bc9b04-ebde-45a7-8cb5-2c13f1aad7eb" providerId="ADAL" clId="{101CA44A-33ED-44ED-B039-616EC25DF3F7}" dt="2022-04-30T14:18:45.061" v="5866" actId="1076"/>
-          <ac:picMkLst>
-            <pc:docMk/>
-            <pc:sldMk cId="657115825" sldId="456"/>
-            <ac:picMk id="6" creationId="{DE7EBD97-CC9E-4249-AC31-F83ED732AE8F}"/>
-          </ac:picMkLst>
-        </pc:picChg>
-        <pc:picChg chg="add mod">
-          <ac:chgData name="Kollmannsberger, Stefan" userId="33bc9b04-ebde-45a7-8cb5-2c13f1aad7eb" providerId="ADAL" clId="{101CA44A-33ED-44ED-B039-616EC25DF3F7}" dt="2022-04-30T14:18:51.615" v="5944" actId="1038"/>
-          <ac:picMkLst>
-            <pc:docMk/>
-            <pc:sldMk cId="657115825" sldId="456"/>
-            <ac:picMk id="8" creationId="{9AD8CB03-E795-4EFA-AC55-81FC83746ADF}"/>
-          </ac:picMkLst>
-        </pc:picChg>
-        <pc:picChg chg="add del mod">
-          <ac:chgData name="Kollmannsberger, Stefan" userId="33bc9b04-ebde-45a7-8cb5-2c13f1aad7eb" providerId="ADAL" clId="{101CA44A-33ED-44ED-B039-616EC25DF3F7}" dt="2022-04-30T14:17:30.856" v="5784" actId="478"/>
-          <ac:picMkLst>
-            <pc:docMk/>
-            <pc:sldMk cId="657115825" sldId="456"/>
-            <ac:picMk id="10" creationId="{D73311D7-CE65-42E4-A3BF-519D653D84D5}"/>
-          </ac:picMkLst>
-        </pc:picChg>
-        <pc:picChg chg="add mod">
-          <ac:chgData name="Kollmannsberger, Stefan" userId="33bc9b04-ebde-45a7-8cb5-2c13f1aad7eb" providerId="ADAL" clId="{101CA44A-33ED-44ED-B039-616EC25DF3F7}" dt="2022-04-30T14:18:45.061" v="5866" actId="1076"/>
-          <ac:picMkLst>
-            <pc:docMk/>
-            <pc:sldMk cId="657115825" sldId="456"/>
-            <ac:picMk id="12" creationId="{C86A6D25-2735-4951-87E2-BEE3E14AA159}"/>
-          </ac:picMkLst>
-        </pc:picChg>
       </pc:sldChg>
       <pc:sldChg chg="addSp delSp modSp add mod ord modAnim chgLayout">
         <pc:chgData name="Kollmannsberger, Stefan" userId="33bc9b04-ebde-45a7-8cb5-2c13f1aad7eb" providerId="ADAL" clId="{101CA44A-33ED-44ED-B039-616EC25DF3F7}" dt="2022-05-02T13:15:23.635" v="8661"/>
@@ -632,150 +319,6 @@
           <pc:docMk/>
           <pc:sldMk cId="402797165" sldId="457"/>
         </pc:sldMkLst>
-        <pc:spChg chg="mod ord">
-          <ac:chgData name="Kollmannsberger, Stefan" userId="33bc9b04-ebde-45a7-8cb5-2c13f1aad7eb" providerId="ADAL" clId="{101CA44A-33ED-44ED-B039-616EC25DF3F7}" dt="2022-04-12T08:45:49.815" v="298" actId="700"/>
-          <ac:spMkLst>
-            <pc:docMk/>
-            <pc:sldMk cId="402797165" sldId="457"/>
-            <ac:spMk id="2" creationId="{8D26780F-0988-438B-A234-333AC641C96E}"/>
-          </ac:spMkLst>
-        </pc:spChg>
-        <pc:spChg chg="mod ord">
-          <ac:chgData name="Kollmannsberger, Stefan" userId="33bc9b04-ebde-45a7-8cb5-2c13f1aad7eb" providerId="ADAL" clId="{101CA44A-33ED-44ED-B039-616EC25DF3F7}" dt="2022-04-12T08:45:49.815" v="298" actId="700"/>
-          <ac:spMkLst>
-            <pc:docMk/>
-            <pc:sldMk cId="402797165" sldId="457"/>
-            <ac:spMk id="3" creationId="{B47C15A1-D146-4322-BEC6-A1F49E001BC2}"/>
-          </ac:spMkLst>
-        </pc:spChg>
-        <pc:spChg chg="mod ord">
-          <ac:chgData name="Kollmannsberger, Stefan" userId="33bc9b04-ebde-45a7-8cb5-2c13f1aad7eb" providerId="ADAL" clId="{101CA44A-33ED-44ED-B039-616EC25DF3F7}" dt="2022-04-12T08:45:49.815" v="298" actId="700"/>
-          <ac:spMkLst>
-            <pc:docMk/>
-            <pc:sldMk cId="402797165" sldId="457"/>
-            <ac:spMk id="5" creationId="{E7FC2BD9-D45F-4312-A9A5-3A7CBA88F175}"/>
-          </ac:spMkLst>
-        </pc:spChg>
-        <pc:spChg chg="add mod">
-          <ac:chgData name="Kollmannsberger, Stefan" userId="33bc9b04-ebde-45a7-8cb5-2c13f1aad7eb" providerId="ADAL" clId="{101CA44A-33ED-44ED-B039-616EC25DF3F7}" dt="2022-05-02T12:51:14.753" v="8395" actId="1036"/>
-          <ac:spMkLst>
-            <pc:docMk/>
-            <pc:sldMk cId="402797165" sldId="457"/>
-            <ac:spMk id="6" creationId="{C2DF57FD-DA61-DAB7-9019-CAEF33FB97A2}"/>
-          </ac:spMkLst>
-        </pc:spChg>
-        <pc:spChg chg="add del mod">
-          <ac:chgData name="Kollmannsberger, Stefan" userId="33bc9b04-ebde-45a7-8cb5-2c13f1aad7eb" providerId="ADAL" clId="{101CA44A-33ED-44ED-B039-616EC25DF3F7}" dt="2022-05-02T12:47:34.023" v="8315" actId="478"/>
-          <ac:spMkLst>
-            <pc:docMk/>
-            <pc:sldMk cId="402797165" sldId="457"/>
-            <ac:spMk id="7" creationId="{A18DBE60-70A3-4DED-A6E3-15E209DB59D4}"/>
-          </ac:spMkLst>
-        </pc:spChg>
-        <pc:spChg chg="add del mod">
-          <ac:chgData name="Kollmannsberger, Stefan" userId="33bc9b04-ebde-45a7-8cb5-2c13f1aad7eb" providerId="ADAL" clId="{101CA44A-33ED-44ED-B039-616EC25DF3F7}" dt="2022-04-12T08:34:50.516" v="83" actId="478"/>
-          <ac:spMkLst>
-            <pc:docMk/>
-            <pc:sldMk cId="402797165" sldId="457"/>
-            <ac:spMk id="8" creationId="{FCD8C5FA-8712-47FE-B141-BA6728837825}"/>
-          </ac:spMkLst>
-        </pc:spChg>
-        <pc:spChg chg="add del mod">
-          <ac:chgData name="Kollmannsberger, Stefan" userId="33bc9b04-ebde-45a7-8cb5-2c13f1aad7eb" providerId="ADAL" clId="{101CA44A-33ED-44ED-B039-616EC25DF3F7}" dt="2022-04-12T08:42:34.535" v="236" actId="478"/>
-          <ac:spMkLst>
-            <pc:docMk/>
-            <pc:sldMk cId="402797165" sldId="457"/>
-            <ac:spMk id="10" creationId="{97F8A841-3A4A-42E4-8231-E6488D775078}"/>
-          </ac:spMkLst>
-        </pc:spChg>
-        <pc:spChg chg="add mod">
-          <ac:chgData name="Kollmannsberger, Stefan" userId="33bc9b04-ebde-45a7-8cb5-2c13f1aad7eb" providerId="ADAL" clId="{101CA44A-33ED-44ED-B039-616EC25DF3F7}" dt="2022-05-02T12:51:14.753" v="8395" actId="1036"/>
-          <ac:spMkLst>
-            <pc:docMk/>
-            <pc:sldMk cId="402797165" sldId="457"/>
-            <ac:spMk id="11" creationId="{5BF13930-5677-87FD-1BF6-7374F206DD2D}"/>
-          </ac:spMkLst>
-        </pc:spChg>
-        <pc:spChg chg="add del mod">
-          <ac:chgData name="Kollmannsberger, Stefan" userId="33bc9b04-ebde-45a7-8cb5-2c13f1aad7eb" providerId="ADAL" clId="{101CA44A-33ED-44ED-B039-616EC25DF3F7}" dt="2022-05-02T12:47:45.187" v="8320" actId="478"/>
-          <ac:spMkLst>
-            <pc:docMk/>
-            <pc:sldMk cId="402797165" sldId="457"/>
-            <ac:spMk id="13" creationId="{BCC6226C-7EB5-4A76-979B-E9985FBC3C1B}"/>
-          </ac:spMkLst>
-        </pc:spChg>
-        <pc:graphicFrameChg chg="del">
-          <ac:chgData name="Kollmannsberger, Stefan" userId="33bc9b04-ebde-45a7-8cb5-2c13f1aad7eb" providerId="ADAL" clId="{101CA44A-33ED-44ED-B039-616EC25DF3F7}" dt="2022-04-12T08:31:21.873" v="73" actId="478"/>
-          <ac:graphicFrameMkLst>
-            <pc:docMk/>
-            <pc:sldMk cId="402797165" sldId="457"/>
-            <ac:graphicFrameMk id="4" creationId="{00000000-0000-0000-0000-000000000000}"/>
-          </ac:graphicFrameMkLst>
-        </pc:graphicFrameChg>
-        <pc:graphicFrameChg chg="add mod">
-          <ac:chgData name="Kollmannsberger, Stefan" userId="33bc9b04-ebde-45a7-8cb5-2c13f1aad7eb" providerId="ADAL" clId="{101CA44A-33ED-44ED-B039-616EC25DF3F7}" dt="2022-05-02T12:51:52.693" v="8397" actId="1076"/>
-          <ac:graphicFrameMkLst>
-            <pc:docMk/>
-            <pc:sldMk cId="402797165" sldId="457"/>
-            <ac:graphicFrameMk id="4" creationId="{87A6DD08-00B9-4491-2A74-E53D1215F539}"/>
-          </ac:graphicFrameMkLst>
-        </pc:graphicFrameChg>
-        <pc:graphicFrameChg chg="del">
-          <ac:chgData name="Kollmannsberger, Stefan" userId="33bc9b04-ebde-45a7-8cb5-2c13f1aad7eb" providerId="ADAL" clId="{101CA44A-33ED-44ED-B039-616EC25DF3F7}" dt="2022-04-12T08:31:26.289" v="74" actId="478"/>
-          <ac:graphicFrameMkLst>
-            <pc:docMk/>
-            <pc:sldMk cId="402797165" sldId="457"/>
-            <ac:graphicFrameMk id="7" creationId="{00000000-0000-0000-0000-000000000000}"/>
-          </ac:graphicFrameMkLst>
-        </pc:graphicFrameChg>
-        <pc:graphicFrameChg chg="add mod">
-          <ac:chgData name="Kollmannsberger, Stefan" userId="33bc9b04-ebde-45a7-8cb5-2c13f1aad7eb" providerId="ADAL" clId="{101CA44A-33ED-44ED-B039-616EC25DF3F7}" dt="2022-05-02T12:50:57.804" v="8366" actId="1076"/>
-          <ac:graphicFrameMkLst>
-            <pc:docMk/>
-            <pc:sldMk cId="402797165" sldId="457"/>
-            <ac:graphicFrameMk id="8" creationId="{DA47B647-4B6D-BFA1-3F24-96EDF74A2629}"/>
-          </ac:graphicFrameMkLst>
-        </pc:graphicFrameChg>
-        <pc:picChg chg="add del">
-          <ac:chgData name="Kollmannsberger, Stefan" userId="33bc9b04-ebde-45a7-8cb5-2c13f1aad7eb" providerId="ADAL" clId="{101CA44A-33ED-44ED-B039-616EC25DF3F7}" dt="2022-04-12T10:26:19.200" v="403" actId="478"/>
-          <ac:picMkLst>
-            <pc:docMk/>
-            <pc:sldMk cId="402797165" sldId="457"/>
-            <ac:picMk id="6" creationId="{F3F00B86-59D9-401E-8384-D41362BA076F}"/>
-          </ac:picMkLst>
-        </pc:picChg>
-        <pc:picChg chg="add del mod">
-          <ac:chgData name="Kollmannsberger, Stefan" userId="33bc9b04-ebde-45a7-8cb5-2c13f1aad7eb" providerId="ADAL" clId="{101CA44A-33ED-44ED-B039-616EC25DF3F7}" dt="2022-05-02T12:45:41.413" v="8251" actId="478"/>
-          <ac:picMkLst>
-            <pc:docMk/>
-            <pc:sldMk cId="402797165" sldId="457"/>
-            <ac:picMk id="12" creationId="{CAB6BDE8-2261-4D52-92C1-447FAC7BFB5E}"/>
-          </ac:picMkLst>
-        </pc:picChg>
-        <pc:picChg chg="add mod">
-          <ac:chgData name="Kollmannsberger, Stefan" userId="33bc9b04-ebde-45a7-8cb5-2c13f1aad7eb" providerId="ADAL" clId="{101CA44A-33ED-44ED-B039-616EC25DF3F7}" dt="2022-05-02T12:51:06.876" v="8370" actId="1076"/>
-          <ac:picMkLst>
-            <pc:docMk/>
-            <pc:sldMk cId="402797165" sldId="457"/>
-            <ac:picMk id="1026" creationId="{C3532903-9C4B-829B-DC9F-697B3E2BE656}"/>
-          </ac:picMkLst>
-        </pc:picChg>
-        <pc:picChg chg="add">
-          <ac:chgData name="Kollmannsberger, Stefan" userId="33bc9b04-ebde-45a7-8cb5-2c13f1aad7eb" providerId="ADAL" clId="{101CA44A-33ED-44ED-B039-616EC25DF3F7}" dt="2022-05-02T12:51:44.567" v="8396"/>
-          <ac:picMkLst>
-            <pc:docMk/>
-            <pc:sldMk cId="402797165" sldId="457"/>
-            <ac:picMk id="1028" creationId="{11E775DA-0C8D-9738-9A9F-A40493D6ECD4}"/>
-          </ac:picMkLst>
-        </pc:picChg>
-        <pc:picChg chg="add del mod">
-          <ac:chgData name="Kollmannsberger, Stefan" userId="33bc9b04-ebde-45a7-8cb5-2c13f1aad7eb" providerId="ADAL" clId="{101CA44A-33ED-44ED-B039-616EC25DF3F7}" dt="2022-05-02T12:53:43.583" v="8400"/>
-          <ac:picMkLst>
-            <pc:docMk/>
-            <pc:sldMk cId="402797165" sldId="457"/>
-            <ac:picMk id="1030" creationId="{A0D986A4-07A6-2C0B-09D0-8721C5A8C503}"/>
-          </ac:picMkLst>
-        </pc:picChg>
       </pc:sldChg>
       <pc:sldChg chg="addSp delSp modSp add mod chgLayout modNotesTx">
         <pc:chgData name="Kollmannsberger, Stefan" userId="33bc9b04-ebde-45a7-8cb5-2c13f1aad7eb" providerId="ADAL" clId="{101CA44A-33ED-44ED-B039-616EC25DF3F7}" dt="2022-05-02T13:17:22.575" v="8725"/>
@@ -783,70 +326,6 @@
           <pc:docMk/>
           <pc:sldMk cId="4058277212" sldId="458"/>
         </pc:sldMkLst>
-        <pc:spChg chg="mod ord">
-          <ac:chgData name="Kollmannsberger, Stefan" userId="33bc9b04-ebde-45a7-8cb5-2c13f1aad7eb" providerId="ADAL" clId="{101CA44A-33ED-44ED-B039-616EC25DF3F7}" dt="2022-04-12T08:46:00.984" v="299" actId="700"/>
-          <ac:spMkLst>
-            <pc:docMk/>
-            <pc:sldMk cId="4058277212" sldId="458"/>
-            <ac:spMk id="2" creationId="{8D26780F-0988-438B-A234-333AC641C96E}"/>
-          </ac:spMkLst>
-        </pc:spChg>
-        <pc:spChg chg="del mod ord">
-          <ac:chgData name="Kollmannsberger, Stefan" userId="33bc9b04-ebde-45a7-8cb5-2c13f1aad7eb" providerId="ADAL" clId="{101CA44A-33ED-44ED-B039-616EC25DF3F7}" dt="2022-05-02T13:17:19.520" v="8723" actId="478"/>
-          <ac:spMkLst>
-            <pc:docMk/>
-            <pc:sldMk cId="4058277212" sldId="458"/>
-            <ac:spMk id="3" creationId="{B47C15A1-D146-4322-BEC6-A1F49E001BC2}"/>
-          </ac:spMkLst>
-        </pc:spChg>
-        <pc:spChg chg="mod ord">
-          <ac:chgData name="Kollmannsberger, Stefan" userId="33bc9b04-ebde-45a7-8cb5-2c13f1aad7eb" providerId="ADAL" clId="{101CA44A-33ED-44ED-B039-616EC25DF3F7}" dt="2022-04-12T08:46:00.984" v="299" actId="700"/>
-          <ac:spMkLst>
-            <pc:docMk/>
-            <pc:sldMk cId="4058277212" sldId="458"/>
-            <ac:spMk id="5" creationId="{E7FC2BD9-D45F-4312-A9A5-3A7CBA88F175}"/>
-          </ac:spMkLst>
-        </pc:spChg>
-        <pc:spChg chg="add del mod">
-          <ac:chgData name="Kollmannsberger, Stefan" userId="33bc9b04-ebde-45a7-8cb5-2c13f1aad7eb" providerId="ADAL" clId="{101CA44A-33ED-44ED-B039-616EC25DF3F7}" dt="2022-05-02T13:17:22.260" v="8724" actId="478"/>
-          <ac:spMkLst>
-            <pc:docMk/>
-            <pc:sldMk cId="4058277212" sldId="458"/>
-            <ac:spMk id="7" creationId="{C956F3E8-B861-7E07-805A-BC024808EAE8}"/>
-          </ac:spMkLst>
-        </pc:spChg>
-        <pc:spChg chg="add mod">
-          <ac:chgData name="Kollmannsberger, Stefan" userId="33bc9b04-ebde-45a7-8cb5-2c13f1aad7eb" providerId="ADAL" clId="{101CA44A-33ED-44ED-B039-616EC25DF3F7}" dt="2022-05-02T13:17:22.575" v="8725"/>
-          <ac:spMkLst>
-            <pc:docMk/>
-            <pc:sldMk cId="4058277212" sldId="458"/>
-            <ac:spMk id="9" creationId="{D2671C95-295D-02EE-FC35-F55BCFE6C061}"/>
-          </ac:spMkLst>
-        </pc:spChg>
-        <pc:spChg chg="mod">
-          <ac:chgData name="Kollmannsberger, Stefan" userId="33bc9b04-ebde-45a7-8cb5-2c13f1aad7eb" providerId="ADAL" clId="{101CA44A-33ED-44ED-B039-616EC25DF3F7}" dt="2022-04-12T08:46:57.034" v="349" actId="1037"/>
-          <ac:spMkLst>
-            <pc:docMk/>
-            <pc:sldMk cId="4058277212" sldId="458"/>
-            <ac:spMk id="10" creationId="{97F8A841-3A4A-42E4-8231-E6488D775078}"/>
-          </ac:spMkLst>
-        </pc:spChg>
-        <pc:picChg chg="add mod">
-          <ac:chgData name="Kollmannsberger, Stefan" userId="33bc9b04-ebde-45a7-8cb5-2c13f1aad7eb" providerId="ADAL" clId="{101CA44A-33ED-44ED-B039-616EC25DF3F7}" dt="2022-04-12T08:46:50.802" v="335" actId="1035"/>
-          <ac:picMkLst>
-            <pc:docMk/>
-            <pc:sldMk cId="4058277212" sldId="458"/>
-            <ac:picMk id="6" creationId="{6E040ADB-369C-4CAE-A038-EA4AC69B3662}"/>
-          </ac:picMkLst>
-        </pc:picChg>
-        <pc:picChg chg="del">
-          <ac:chgData name="Kollmannsberger, Stefan" userId="33bc9b04-ebde-45a7-8cb5-2c13f1aad7eb" providerId="ADAL" clId="{101CA44A-33ED-44ED-B039-616EC25DF3F7}" dt="2022-04-12T08:40:23.267" v="111" actId="478"/>
-          <ac:picMkLst>
-            <pc:docMk/>
-            <pc:sldMk cId="4058277212" sldId="458"/>
-            <ac:picMk id="12" creationId="{CAB6BDE8-2261-4D52-92C1-447FAC7BFB5E}"/>
-          </ac:picMkLst>
-        </pc:picChg>
       </pc:sldChg>
       <pc:sldChg chg="addSp delSp modSp add mod chgLayout modNotesTx">
         <pc:chgData name="Kollmannsberger, Stefan" userId="33bc9b04-ebde-45a7-8cb5-2c13f1aad7eb" providerId="ADAL" clId="{101CA44A-33ED-44ED-B039-616EC25DF3F7}" dt="2022-04-12T10:35:13.129" v="606" actId="20577"/>
@@ -854,86 +333,6 @@
           <pc:docMk/>
           <pc:sldMk cId="1962228168" sldId="459"/>
         </pc:sldMkLst>
-        <pc:spChg chg="del mod ord">
-          <ac:chgData name="Kollmannsberger, Stefan" userId="33bc9b04-ebde-45a7-8cb5-2c13f1aad7eb" providerId="ADAL" clId="{101CA44A-33ED-44ED-B039-616EC25DF3F7}" dt="2022-04-12T10:30:49.034" v="494" actId="478"/>
-          <ac:spMkLst>
-            <pc:docMk/>
-            <pc:sldMk cId="1962228168" sldId="459"/>
-            <ac:spMk id="2" creationId="{8D26780F-0988-438B-A234-333AC641C96E}"/>
-          </ac:spMkLst>
-        </pc:spChg>
-        <pc:spChg chg="mod ord">
-          <ac:chgData name="Kollmannsberger, Stefan" userId="33bc9b04-ebde-45a7-8cb5-2c13f1aad7eb" providerId="ADAL" clId="{101CA44A-33ED-44ED-B039-616EC25DF3F7}" dt="2022-04-12T08:46:08.005" v="300" actId="700"/>
-          <ac:spMkLst>
-            <pc:docMk/>
-            <pc:sldMk cId="1962228168" sldId="459"/>
-            <ac:spMk id="3" creationId="{B47C15A1-D146-4322-BEC6-A1F49E001BC2}"/>
-          </ac:spMkLst>
-        </pc:spChg>
-        <pc:spChg chg="mod ord">
-          <ac:chgData name="Kollmannsberger, Stefan" userId="33bc9b04-ebde-45a7-8cb5-2c13f1aad7eb" providerId="ADAL" clId="{101CA44A-33ED-44ED-B039-616EC25DF3F7}" dt="2022-04-12T08:46:08.005" v="300" actId="700"/>
-          <ac:spMkLst>
-            <pc:docMk/>
-            <pc:sldMk cId="1962228168" sldId="459"/>
-            <ac:spMk id="5" creationId="{E7FC2BD9-D45F-4312-A9A5-3A7CBA88F175}"/>
-          </ac:spMkLst>
-        </pc:spChg>
-        <pc:spChg chg="add del mod">
-          <ac:chgData name="Kollmannsberger, Stefan" userId="33bc9b04-ebde-45a7-8cb5-2c13f1aad7eb" providerId="ADAL" clId="{101CA44A-33ED-44ED-B039-616EC25DF3F7}" dt="2022-04-12T10:30:53.105" v="495" actId="478"/>
-          <ac:spMkLst>
-            <pc:docMk/>
-            <pc:sldMk cId="1962228168" sldId="459"/>
-            <ac:spMk id="6" creationId="{ED7A1C99-0712-4544-8CD8-88F51BC10299}"/>
-          </ac:spMkLst>
-        </pc:spChg>
-        <pc:spChg chg="add mod">
-          <ac:chgData name="Kollmannsberger, Stefan" userId="33bc9b04-ebde-45a7-8cb5-2c13f1aad7eb" providerId="ADAL" clId="{101CA44A-33ED-44ED-B039-616EC25DF3F7}" dt="2022-04-12T10:32:13.229" v="521" actId="1076"/>
-          <ac:spMkLst>
-            <pc:docMk/>
-            <pc:sldMk cId="1962228168" sldId="459"/>
-            <ac:spMk id="11" creationId="{3DB9A127-E965-46E4-8DB7-D156FA20FA77}"/>
-          </ac:spMkLst>
-        </pc:spChg>
-        <pc:spChg chg="add mod">
-          <ac:chgData name="Kollmannsberger, Stefan" userId="33bc9b04-ebde-45a7-8cb5-2c13f1aad7eb" providerId="ADAL" clId="{101CA44A-33ED-44ED-B039-616EC25DF3F7}" dt="2022-04-12T10:32:46.015" v="537" actId="14100"/>
-          <ac:spMkLst>
-            <pc:docMk/>
-            <pc:sldMk cId="1962228168" sldId="459"/>
-            <ac:spMk id="12" creationId="{0407CD5D-29B6-4D89-B365-67CFD784BDA2}"/>
-          </ac:spMkLst>
-        </pc:spChg>
-        <pc:spChg chg="add mod">
-          <ac:chgData name="Kollmannsberger, Stefan" userId="33bc9b04-ebde-45a7-8cb5-2c13f1aad7eb" providerId="ADAL" clId="{101CA44A-33ED-44ED-B039-616EC25DF3F7}" dt="2022-04-12T10:33:29.873" v="566" actId="20577"/>
-          <ac:spMkLst>
-            <pc:docMk/>
-            <pc:sldMk cId="1962228168" sldId="459"/>
-            <ac:spMk id="13" creationId="{6E4B8AF2-AED1-41FE-B886-2EA557B4C385}"/>
-          </ac:spMkLst>
-        </pc:spChg>
-        <pc:spChg chg="add mod">
-          <ac:chgData name="Kollmannsberger, Stefan" userId="33bc9b04-ebde-45a7-8cb5-2c13f1aad7eb" providerId="ADAL" clId="{101CA44A-33ED-44ED-B039-616EC25DF3F7}" dt="2022-04-12T10:34:24.793" v="595" actId="20577"/>
-          <ac:spMkLst>
-            <pc:docMk/>
-            <pc:sldMk cId="1962228168" sldId="459"/>
-            <ac:spMk id="14" creationId="{1AF3B805-99C8-4DCB-B795-81F48898D9AB}"/>
-          </ac:spMkLst>
-        </pc:spChg>
-        <pc:picChg chg="del">
-          <ac:chgData name="Kollmannsberger, Stefan" userId="33bc9b04-ebde-45a7-8cb5-2c13f1aad7eb" providerId="ADAL" clId="{101CA44A-33ED-44ED-B039-616EC25DF3F7}" dt="2022-04-12T08:42:57.858" v="255" actId="478"/>
-          <ac:picMkLst>
-            <pc:docMk/>
-            <pc:sldMk cId="1962228168" sldId="459"/>
-            <ac:picMk id="6" creationId="{6E040ADB-369C-4CAE-A038-EA4AC69B3662}"/>
-          </ac:picMkLst>
-        </pc:picChg>
-        <pc:picChg chg="add mod">
-          <ac:chgData name="Kollmannsberger, Stefan" userId="33bc9b04-ebde-45a7-8cb5-2c13f1aad7eb" providerId="ADAL" clId="{101CA44A-33ED-44ED-B039-616EC25DF3F7}" dt="2022-04-12T08:46:39.080" v="318" actId="1037"/>
-          <ac:picMkLst>
-            <pc:docMk/>
-            <pc:sldMk cId="1962228168" sldId="459"/>
-            <ac:picMk id="7" creationId="{ED94F1EA-D593-4406-9C89-70EA31785E2C}"/>
-          </ac:picMkLst>
-        </pc:picChg>
       </pc:sldChg>
       <pc:sldChg chg="addSp delSp modSp add mod">
         <pc:chgData name="Kollmannsberger, Stefan" userId="33bc9b04-ebde-45a7-8cb5-2c13f1aad7eb" providerId="ADAL" clId="{101CA44A-33ED-44ED-B039-616EC25DF3F7}" dt="2022-05-02T13:17:54.659" v="8728"/>
@@ -941,78 +340,6 @@
           <pc:docMk/>
           <pc:sldMk cId="1367436238" sldId="460"/>
         </pc:sldMkLst>
-        <pc:spChg chg="del">
-          <ac:chgData name="Kollmannsberger, Stefan" userId="33bc9b04-ebde-45a7-8cb5-2c13f1aad7eb" providerId="ADAL" clId="{101CA44A-33ED-44ED-B039-616EC25DF3F7}" dt="2022-05-02T13:17:51.044" v="8726" actId="478"/>
-          <ac:spMkLst>
-            <pc:docMk/>
-            <pc:sldMk cId="1367436238" sldId="460"/>
-            <ac:spMk id="3" creationId="{B47C15A1-D146-4322-BEC6-A1F49E001BC2}"/>
-          </ac:spMkLst>
-        </pc:spChg>
-        <pc:spChg chg="add del mod">
-          <ac:chgData name="Kollmannsberger, Stefan" userId="33bc9b04-ebde-45a7-8cb5-2c13f1aad7eb" providerId="ADAL" clId="{101CA44A-33ED-44ED-B039-616EC25DF3F7}" dt="2022-05-02T13:17:53.977" v="8727" actId="478"/>
-          <ac:spMkLst>
-            <pc:docMk/>
-            <pc:sldMk cId="1367436238" sldId="460"/>
-            <ac:spMk id="7" creationId="{F2189F32-C816-D795-C07E-578FBB59DD9A}"/>
-          </ac:spMkLst>
-        </pc:spChg>
-        <pc:spChg chg="add del">
-          <ac:chgData name="Kollmannsberger, Stefan" userId="33bc9b04-ebde-45a7-8cb5-2c13f1aad7eb" providerId="ADAL" clId="{101CA44A-33ED-44ED-B039-616EC25DF3F7}" dt="2022-04-12T10:35:45.244" v="614" actId="22"/>
-          <ac:spMkLst>
-            <pc:docMk/>
-            <pc:sldMk cId="1367436238" sldId="460"/>
-            <ac:spMk id="12" creationId="{99FFCA7B-7C3F-46EB-8812-FF07432DF985}"/>
-          </ac:spMkLst>
-        </pc:spChg>
-        <pc:spChg chg="add mod">
-          <ac:chgData name="Kollmannsberger, Stefan" userId="33bc9b04-ebde-45a7-8cb5-2c13f1aad7eb" providerId="ADAL" clId="{101CA44A-33ED-44ED-B039-616EC25DF3F7}" dt="2022-05-02T13:17:54.659" v="8728"/>
-          <ac:spMkLst>
-            <pc:docMk/>
-            <pc:sldMk cId="1367436238" sldId="460"/>
-            <ac:spMk id="12" creationId="{9CAD6151-3CDF-9E11-D5D6-4D3B89DD03FB}"/>
-          </ac:spMkLst>
-        </pc:spChg>
-        <pc:spChg chg="add mod">
-          <ac:chgData name="Kollmannsberger, Stefan" userId="33bc9b04-ebde-45a7-8cb5-2c13f1aad7eb" providerId="ADAL" clId="{101CA44A-33ED-44ED-B039-616EC25DF3F7}" dt="2022-04-12T10:52:36.788" v="2303" actId="1037"/>
-          <ac:spMkLst>
-            <pc:docMk/>
-            <pc:sldMk cId="1367436238" sldId="460"/>
-            <ac:spMk id="14" creationId="{0539BAF5-680F-4E16-A6B8-C5D19D68F2C5}"/>
-          </ac:spMkLst>
-        </pc:spChg>
-        <pc:spChg chg="add mod">
-          <ac:chgData name="Kollmannsberger, Stefan" userId="33bc9b04-ebde-45a7-8cb5-2c13f1aad7eb" providerId="ADAL" clId="{101CA44A-33ED-44ED-B039-616EC25DF3F7}" dt="2022-05-02T12:58:19.450" v="8523" actId="20577"/>
-          <ac:spMkLst>
-            <pc:docMk/>
-            <pc:sldMk cId="1367436238" sldId="460"/>
-            <ac:spMk id="15" creationId="{BE6806B3-ECD2-43EB-9451-A4018E33656F}"/>
-          </ac:spMkLst>
-        </pc:spChg>
-        <pc:picChg chg="add mod">
-          <ac:chgData name="Kollmannsberger, Stefan" userId="33bc9b04-ebde-45a7-8cb5-2c13f1aad7eb" providerId="ADAL" clId="{101CA44A-33ED-44ED-B039-616EC25DF3F7}" dt="2022-04-12T10:23:25.341" v="356" actId="1076"/>
-          <ac:picMkLst>
-            <pc:docMk/>
-            <pc:sldMk cId="1367436238" sldId="460"/>
-            <ac:picMk id="6" creationId="{37C88B4F-9AA1-4B2B-8D07-A9168CE9EBB7}"/>
-          </ac:picMkLst>
-        </pc:picChg>
-        <pc:picChg chg="del">
-          <ac:chgData name="Kollmannsberger, Stefan" userId="33bc9b04-ebde-45a7-8cb5-2c13f1aad7eb" providerId="ADAL" clId="{101CA44A-33ED-44ED-B039-616EC25DF3F7}" dt="2022-04-12T10:21:19.595" v="353" actId="478"/>
-          <ac:picMkLst>
-            <pc:docMk/>
-            <pc:sldMk cId="1367436238" sldId="460"/>
-            <ac:picMk id="7" creationId="{ED94F1EA-D593-4406-9C89-70EA31785E2C}"/>
-          </ac:picMkLst>
-        </pc:picChg>
-        <pc:picChg chg="add mod">
-          <ac:chgData name="Kollmannsberger, Stefan" userId="33bc9b04-ebde-45a7-8cb5-2c13f1aad7eb" providerId="ADAL" clId="{101CA44A-33ED-44ED-B039-616EC25DF3F7}" dt="2022-04-12T10:23:38.281" v="359" actId="14100"/>
-          <ac:picMkLst>
-            <pc:docMk/>
-            <pc:sldMk cId="1367436238" sldId="460"/>
-            <ac:picMk id="9" creationId="{6AACD312-C4DE-457C-B6EC-4D30622423EC}"/>
-          </ac:picMkLst>
-        </pc:picChg>
       </pc:sldChg>
       <pc:sldChg chg="add del">
         <pc:chgData name="Kollmannsberger, Stefan" userId="33bc9b04-ebde-45a7-8cb5-2c13f1aad7eb" providerId="ADAL" clId="{101CA44A-33ED-44ED-B039-616EC25DF3F7}" dt="2022-04-12T12:51:51.606" v="2495" actId="2890"/>
@@ -1027,30 +354,6 @@
           <pc:docMk/>
           <pc:sldMk cId="3444261836" sldId="461"/>
         </pc:sldMkLst>
-        <pc:spChg chg="del mod">
-          <ac:chgData name="Kollmannsberger, Stefan" userId="33bc9b04-ebde-45a7-8cb5-2c13f1aad7eb" providerId="ADAL" clId="{101CA44A-33ED-44ED-B039-616EC25DF3F7}" dt="2022-04-12T10:40:30.276" v="1085" actId="478"/>
-          <ac:spMkLst>
-            <pc:docMk/>
-            <pc:sldMk cId="3444261836" sldId="461"/>
-            <ac:spMk id="14" creationId="{0539BAF5-680F-4E16-A6B8-C5D19D68F2C5}"/>
-          </ac:spMkLst>
-        </pc:spChg>
-        <pc:picChg chg="del">
-          <ac:chgData name="Kollmannsberger, Stefan" userId="33bc9b04-ebde-45a7-8cb5-2c13f1aad7eb" providerId="ADAL" clId="{101CA44A-33ED-44ED-B039-616EC25DF3F7}" dt="2022-04-12T10:39:15.001" v="901" actId="478"/>
-          <ac:picMkLst>
-            <pc:docMk/>
-            <pc:sldMk cId="3444261836" sldId="461"/>
-            <ac:picMk id="6" creationId="{37C88B4F-9AA1-4B2B-8D07-A9168CE9EBB7}"/>
-          </ac:picMkLst>
-        </pc:picChg>
-        <pc:picChg chg="del">
-          <ac:chgData name="Kollmannsberger, Stefan" userId="33bc9b04-ebde-45a7-8cb5-2c13f1aad7eb" providerId="ADAL" clId="{101CA44A-33ED-44ED-B039-616EC25DF3F7}" dt="2022-04-12T10:39:18.061" v="902" actId="478"/>
-          <ac:picMkLst>
-            <pc:docMk/>
-            <pc:sldMk cId="3444261836" sldId="461"/>
-            <ac:picMk id="9" creationId="{6AACD312-C4DE-457C-B6EC-4D30622423EC}"/>
-          </ac:picMkLst>
-        </pc:picChg>
       </pc:sldChg>
       <pc:sldChg chg="addSp delSp modSp add mod modAnim">
         <pc:chgData name="Kollmannsberger, Stefan" userId="33bc9b04-ebde-45a7-8cb5-2c13f1aad7eb" providerId="ADAL" clId="{101CA44A-33ED-44ED-B039-616EC25DF3F7}" dt="2022-05-02T13:07:08.822" v="8597"/>
@@ -1058,102 +361,6 @@
           <pc:docMk/>
           <pc:sldMk cId="4167901986" sldId="461"/>
         </pc:sldMkLst>
-        <pc:spChg chg="mod">
-          <ac:chgData name="Kollmannsberger, Stefan" userId="33bc9b04-ebde-45a7-8cb5-2c13f1aad7eb" providerId="ADAL" clId="{101CA44A-33ED-44ED-B039-616EC25DF3F7}" dt="2022-04-12T13:44:15.792" v="4987" actId="114"/>
-          <ac:spMkLst>
-            <pc:docMk/>
-            <pc:sldMk cId="4167901986" sldId="461"/>
-            <ac:spMk id="2" creationId="{8D26780F-0988-438B-A234-333AC641C96E}"/>
-          </ac:spMkLst>
-        </pc:spChg>
-        <pc:spChg chg="mod">
-          <ac:chgData name="Kollmannsberger, Stefan" userId="33bc9b04-ebde-45a7-8cb5-2c13f1aad7eb" providerId="ADAL" clId="{101CA44A-33ED-44ED-B039-616EC25DF3F7}" dt="2022-04-30T13:49:07.498" v="5036" actId="207"/>
-          <ac:spMkLst>
-            <pc:docMk/>
-            <pc:sldMk cId="4167901986" sldId="461"/>
-            <ac:spMk id="3" creationId="{B47C15A1-D146-4322-BEC6-A1F49E001BC2}"/>
-          </ac:spMkLst>
-        </pc:spChg>
-        <pc:spChg chg="add del mod">
-          <ac:chgData name="Kollmannsberger, Stefan" userId="33bc9b04-ebde-45a7-8cb5-2c13f1aad7eb" providerId="ADAL" clId="{101CA44A-33ED-44ED-B039-616EC25DF3F7}" dt="2022-04-12T12:52:45.576" v="2504"/>
-          <ac:spMkLst>
-            <pc:docMk/>
-            <pc:sldMk cId="4167901986" sldId="461"/>
-            <ac:spMk id="7" creationId="{57C99D40-08BC-4E53-85F0-C65BEE22FCB6}"/>
-          </ac:spMkLst>
-        </pc:spChg>
-        <pc:spChg chg="add mod">
-          <ac:chgData name="Kollmannsberger, Stefan" userId="33bc9b04-ebde-45a7-8cb5-2c13f1aad7eb" providerId="ADAL" clId="{101CA44A-33ED-44ED-B039-616EC25DF3F7}" dt="2022-05-02T13:04:34.482" v="8591" actId="20577"/>
-          <ac:spMkLst>
-            <pc:docMk/>
-            <pc:sldMk cId="4167901986" sldId="461"/>
-            <ac:spMk id="11" creationId="{6BDCD803-407E-47A0-A703-A7AA2B3881B4}"/>
-          </ac:spMkLst>
-        </pc:spChg>
-        <pc:spChg chg="add del mod">
-          <ac:chgData name="Kollmannsberger, Stefan" userId="33bc9b04-ebde-45a7-8cb5-2c13f1aad7eb" providerId="ADAL" clId="{101CA44A-33ED-44ED-B039-616EC25DF3F7}" dt="2022-04-12T13:00:12.679" v="3133" actId="478"/>
-          <ac:spMkLst>
-            <pc:docMk/>
-            <pc:sldMk cId="4167901986" sldId="461"/>
-            <ac:spMk id="12" creationId="{9ABA5D80-EAF4-4CA9-8369-69924612A83D}"/>
-          </ac:spMkLst>
-        </pc:spChg>
-        <pc:spChg chg="add del mod">
-          <ac:chgData name="Kollmannsberger, Stefan" userId="33bc9b04-ebde-45a7-8cb5-2c13f1aad7eb" providerId="ADAL" clId="{101CA44A-33ED-44ED-B039-616EC25DF3F7}" dt="2022-04-12T13:00:26.910" v="3138" actId="478"/>
-          <ac:spMkLst>
-            <pc:docMk/>
-            <pc:sldMk cId="4167901986" sldId="461"/>
-            <ac:spMk id="13" creationId="{5EB35750-4080-4451-AA2D-F47D6E69B829}"/>
-          </ac:spMkLst>
-        </pc:spChg>
-        <pc:spChg chg="add mod">
-          <ac:chgData name="Kollmannsberger, Stefan" userId="33bc9b04-ebde-45a7-8cb5-2c13f1aad7eb" providerId="ADAL" clId="{101CA44A-33ED-44ED-B039-616EC25DF3F7}" dt="2022-04-12T13:16:35.188" v="3964"/>
-          <ac:spMkLst>
-            <pc:docMk/>
-            <pc:sldMk cId="4167901986" sldId="461"/>
-            <ac:spMk id="18" creationId="{A4831317-EDEF-41AD-98B4-C5B7F0DF6229}"/>
-          </ac:spMkLst>
-        </pc:spChg>
-        <pc:graphicFrameChg chg="del">
-          <ac:chgData name="Kollmannsberger, Stefan" userId="33bc9b04-ebde-45a7-8cb5-2c13f1aad7eb" providerId="ADAL" clId="{101CA44A-33ED-44ED-B039-616EC25DF3F7}" dt="2022-04-12T12:52:17.652" v="2502" actId="478"/>
-          <ac:graphicFrameMkLst>
-            <pc:docMk/>
-            <pc:sldMk cId="4167901986" sldId="461"/>
-            <ac:graphicFrameMk id="6" creationId="{00000000-0000-0000-0000-000000000000}"/>
-          </ac:graphicFrameMkLst>
-        </pc:graphicFrameChg>
-        <pc:picChg chg="add del mod">
-          <ac:chgData name="Kollmannsberger, Stefan" userId="33bc9b04-ebde-45a7-8cb5-2c13f1aad7eb" providerId="ADAL" clId="{101CA44A-33ED-44ED-B039-616EC25DF3F7}" dt="2022-04-12T12:54:11.461" v="2571" actId="478"/>
-          <ac:picMkLst>
-            <pc:docMk/>
-            <pc:sldMk cId="4167901986" sldId="461"/>
-            <ac:picMk id="8" creationId="{01322B1D-7D54-4C26-AF23-D41A2A5D791F}"/>
-          </ac:picMkLst>
-        </pc:picChg>
-        <pc:picChg chg="add mod">
-          <ac:chgData name="Kollmannsberger, Stefan" userId="33bc9b04-ebde-45a7-8cb5-2c13f1aad7eb" providerId="ADAL" clId="{101CA44A-33ED-44ED-B039-616EC25DF3F7}" dt="2022-04-12T13:17:10.638" v="3999" actId="14100"/>
-          <ac:picMkLst>
-            <pc:docMk/>
-            <pc:sldMk cId="4167901986" sldId="461"/>
-            <ac:picMk id="10" creationId="{77F342F4-1D1F-47C4-A872-35C5817EC74D}"/>
-          </ac:picMkLst>
-        </pc:picChg>
-        <pc:picChg chg="add mod ord">
-          <ac:chgData name="Kollmannsberger, Stefan" userId="33bc9b04-ebde-45a7-8cb5-2c13f1aad7eb" providerId="ADAL" clId="{101CA44A-33ED-44ED-B039-616EC25DF3F7}" dt="2022-05-02T13:06:34.183" v="8594" actId="1076"/>
-          <ac:picMkLst>
-            <pc:docMk/>
-            <pc:sldMk cId="4167901986" sldId="461"/>
-            <ac:picMk id="15" creationId="{3E5BFC08-B523-4A01-83CE-110FF502C498}"/>
-          </ac:picMkLst>
-        </pc:picChg>
-        <pc:picChg chg="add del mod">
-          <ac:chgData name="Kollmannsberger, Stefan" userId="33bc9b04-ebde-45a7-8cb5-2c13f1aad7eb" providerId="ADAL" clId="{101CA44A-33ED-44ED-B039-616EC25DF3F7}" dt="2022-04-12T13:04:20.581" v="3255" actId="478"/>
-          <ac:picMkLst>
-            <pc:docMk/>
-            <pc:sldMk cId="4167901986" sldId="461"/>
-            <ac:picMk id="17" creationId="{19B873C1-40EE-45DD-875F-7896814F05C1}"/>
-          </ac:picMkLst>
-        </pc:picChg>
       </pc:sldChg>
       <pc:sldChg chg="addSp delSp modSp add mod ord modAnim">
         <pc:chgData name="Kollmannsberger, Stefan" userId="33bc9b04-ebde-45a7-8cb5-2c13f1aad7eb" providerId="ADAL" clId="{101CA44A-33ED-44ED-B039-616EC25DF3F7}" dt="2022-05-02T13:26:12.059" v="8894" actId="20577"/>
@@ -1161,86 +368,6 @@
           <pc:docMk/>
           <pc:sldMk cId="3984339890" sldId="462"/>
         </pc:sldMkLst>
-        <pc:spChg chg="mod">
-          <ac:chgData name="Kollmannsberger, Stefan" userId="33bc9b04-ebde-45a7-8cb5-2c13f1aad7eb" providerId="ADAL" clId="{101CA44A-33ED-44ED-B039-616EC25DF3F7}" dt="2022-05-02T13:19:28.057" v="8735" actId="255"/>
-          <ac:spMkLst>
-            <pc:docMk/>
-            <pc:sldMk cId="3984339890" sldId="462"/>
-            <ac:spMk id="2" creationId="{00000000-0000-0000-0000-000000000000}"/>
-          </ac:spMkLst>
-        </pc:spChg>
-        <pc:spChg chg="mod">
-          <ac:chgData name="Kollmannsberger, Stefan" userId="33bc9b04-ebde-45a7-8cb5-2c13f1aad7eb" providerId="ADAL" clId="{101CA44A-33ED-44ED-B039-616EC25DF3F7}" dt="2022-05-02T13:05:43.515" v="8593" actId="790"/>
-          <ac:spMkLst>
-            <pc:docMk/>
-            <pc:sldMk cId="3984339890" sldId="462"/>
-            <ac:spMk id="3" creationId="{00000000-0000-0000-0000-000000000000}"/>
-          </ac:spMkLst>
-        </pc:spChg>
-        <pc:spChg chg="mod">
-          <ac:chgData name="Kollmannsberger, Stefan" userId="33bc9b04-ebde-45a7-8cb5-2c13f1aad7eb" providerId="ADAL" clId="{101CA44A-33ED-44ED-B039-616EC25DF3F7}" dt="2022-05-02T13:05:43.515" v="8593" actId="790"/>
-          <ac:spMkLst>
-            <pc:docMk/>
-            <pc:sldMk cId="3984339890" sldId="462"/>
-            <ac:spMk id="4" creationId="{00000000-0000-0000-0000-000000000000}"/>
-          </ac:spMkLst>
-        </pc:spChg>
-        <pc:spChg chg="del mod">
-          <ac:chgData name="Kollmannsberger, Stefan" userId="33bc9b04-ebde-45a7-8cb5-2c13f1aad7eb" providerId="ADAL" clId="{101CA44A-33ED-44ED-B039-616EC25DF3F7}" dt="2022-05-02T13:20:53.925" v="8738" actId="478"/>
-          <ac:spMkLst>
-            <pc:docMk/>
-            <pc:sldMk cId="3984339890" sldId="462"/>
-            <ac:spMk id="7" creationId="{E0B12FCF-C821-42E7-B543-AFF1C08C88E0}"/>
-          </ac:spMkLst>
-        </pc:spChg>
-        <pc:spChg chg="add mod">
-          <ac:chgData name="Kollmannsberger, Stefan" userId="33bc9b04-ebde-45a7-8cb5-2c13f1aad7eb" providerId="ADAL" clId="{101CA44A-33ED-44ED-B039-616EC25DF3F7}" dt="2022-05-02T13:22:47.086" v="8830" actId="20577"/>
-          <ac:spMkLst>
-            <pc:docMk/>
-            <pc:sldMk cId="3984339890" sldId="462"/>
-            <ac:spMk id="9" creationId="{2CE2B2E2-D481-28B9-D4D9-55B8B6DECB98}"/>
-          </ac:spMkLst>
-        </pc:spChg>
-        <pc:spChg chg="add mod">
-          <ac:chgData name="Kollmannsberger, Stefan" userId="33bc9b04-ebde-45a7-8cb5-2c13f1aad7eb" providerId="ADAL" clId="{101CA44A-33ED-44ED-B039-616EC25DF3F7}" dt="2022-05-02T13:26:12.059" v="8894" actId="20577"/>
-          <ac:spMkLst>
-            <pc:docMk/>
-            <pc:sldMk cId="3984339890" sldId="462"/>
-            <ac:spMk id="11" creationId="{C56B8FCF-621F-7E86-E2CD-43AFB286D3DB}"/>
-          </ac:spMkLst>
-        </pc:spChg>
-        <pc:grpChg chg="add mod">
-          <ac:chgData name="Kollmannsberger, Stefan" userId="33bc9b04-ebde-45a7-8cb5-2c13f1aad7eb" providerId="ADAL" clId="{101CA44A-33ED-44ED-B039-616EC25DF3F7}" dt="2022-05-02T13:25:49.187" v="8882" actId="164"/>
-          <ac:grpSpMkLst>
-            <pc:docMk/>
-            <pc:sldMk cId="3984339890" sldId="462"/>
-            <ac:grpSpMk id="8" creationId="{B8DA0F4E-EDD0-1332-5439-5999353FDDD8}"/>
-          </ac:grpSpMkLst>
-        </pc:grpChg>
-        <pc:picChg chg="add mod">
-          <ac:chgData name="Kollmannsberger, Stefan" userId="33bc9b04-ebde-45a7-8cb5-2c13f1aad7eb" providerId="ADAL" clId="{101CA44A-33ED-44ED-B039-616EC25DF3F7}" dt="2022-04-12T13:27:07.966" v="4429" actId="1076"/>
-          <ac:picMkLst>
-            <pc:docMk/>
-            <pc:sldMk cId="3984339890" sldId="462"/>
-            <ac:picMk id="6" creationId="{CBE3E622-12C3-461B-AC42-AF65B485E608}"/>
-          </ac:picMkLst>
-        </pc:picChg>
-        <pc:picChg chg="del">
-          <ac:chgData name="Kollmannsberger, Stefan" userId="33bc9b04-ebde-45a7-8cb5-2c13f1aad7eb" providerId="ADAL" clId="{101CA44A-33ED-44ED-B039-616EC25DF3F7}" dt="2022-04-12T13:26:15.650" v="4427" actId="478"/>
-          <ac:picMkLst>
-            <pc:docMk/>
-            <pc:sldMk cId="3984339890" sldId="462"/>
-            <ac:picMk id="9" creationId="{017E02A7-A8F2-4A5C-8595-BFE9F2DDA3CF}"/>
-          </ac:picMkLst>
-        </pc:picChg>
-        <pc:picChg chg="add mod">
-          <ac:chgData name="Kollmannsberger, Stefan" userId="33bc9b04-ebde-45a7-8cb5-2c13f1aad7eb" providerId="ADAL" clId="{101CA44A-33ED-44ED-B039-616EC25DF3F7}" dt="2022-05-02T13:25:49.187" v="8882" actId="164"/>
-          <ac:picMkLst>
-            <pc:docMk/>
-            <pc:sldMk cId="3984339890" sldId="462"/>
-            <ac:picMk id="10" creationId="{A426E36D-730B-4410-9463-0BA04ED53715}"/>
-          </ac:picMkLst>
-        </pc:picChg>
       </pc:sldChg>
       <pc:sldChg chg="addSp delSp modSp new mod modAnim">
         <pc:chgData name="Kollmannsberger, Stefan" userId="33bc9b04-ebde-45a7-8cb5-2c13f1aad7eb" providerId="ADAL" clId="{101CA44A-33ED-44ED-B039-616EC25DF3F7}" dt="2022-05-02T13:19:15.002" v="8734"/>
@@ -1248,78 +375,6 @@
           <pc:docMk/>
           <pc:sldMk cId="258752027" sldId="463"/>
         </pc:sldMkLst>
-        <pc:spChg chg="add del mod">
-          <ac:chgData name="Kollmannsberger, Stefan" userId="33bc9b04-ebde-45a7-8cb5-2c13f1aad7eb" providerId="ADAL" clId="{101CA44A-33ED-44ED-B039-616EC25DF3F7}" dt="2022-05-02T13:18:38.412" v="8732" actId="255"/>
-          <ac:spMkLst>
-            <pc:docMk/>
-            <pc:sldMk cId="258752027" sldId="463"/>
-            <ac:spMk id="2" creationId="{7F3A731E-F48B-4B81-B46F-6832A754EDFB}"/>
-          </ac:spMkLst>
-        </pc:spChg>
-        <pc:spChg chg="mod">
-          <ac:chgData name="Kollmannsberger, Stefan" userId="33bc9b04-ebde-45a7-8cb5-2c13f1aad7eb" providerId="ADAL" clId="{101CA44A-33ED-44ED-B039-616EC25DF3F7}" dt="2022-05-02T13:05:28.054" v="8592" actId="790"/>
-          <ac:spMkLst>
-            <pc:docMk/>
-            <pc:sldMk cId="258752027" sldId="463"/>
-            <ac:spMk id="3" creationId="{87CF9C2F-248A-4D93-993B-A06B2EB6A464}"/>
-          </ac:spMkLst>
-        </pc:spChg>
-        <pc:spChg chg="mod">
-          <ac:chgData name="Kollmannsberger, Stefan" userId="33bc9b04-ebde-45a7-8cb5-2c13f1aad7eb" providerId="ADAL" clId="{101CA44A-33ED-44ED-B039-616EC25DF3F7}" dt="2022-05-02T13:05:28.054" v="8592" actId="790"/>
-          <ac:spMkLst>
-            <pc:docMk/>
-            <pc:sldMk cId="258752027" sldId="463"/>
-            <ac:spMk id="4" creationId="{08192A97-8603-42CE-9038-2DE655218BD9}"/>
-          </ac:spMkLst>
-        </pc:spChg>
-        <pc:spChg chg="add mod">
-          <ac:chgData name="Kollmannsberger, Stefan" userId="33bc9b04-ebde-45a7-8cb5-2c13f1aad7eb" providerId="ADAL" clId="{101CA44A-33ED-44ED-B039-616EC25DF3F7}" dt="2022-05-02T13:05:28.054" v="8592" actId="790"/>
-          <ac:spMkLst>
-            <pc:docMk/>
-            <pc:sldMk cId="258752027" sldId="463"/>
-            <ac:spMk id="9" creationId="{30C71C30-5350-4A68-905A-6452D0728154}"/>
-          </ac:spMkLst>
-        </pc:spChg>
-        <pc:spChg chg="add mod">
-          <ac:chgData name="Kollmannsberger, Stefan" userId="33bc9b04-ebde-45a7-8cb5-2c13f1aad7eb" providerId="ADAL" clId="{101CA44A-33ED-44ED-B039-616EC25DF3F7}" dt="2022-05-02T13:19:05.648" v="8733" actId="164"/>
-          <ac:spMkLst>
-            <pc:docMk/>
-            <pc:sldMk cId="258752027" sldId="463"/>
-            <ac:spMk id="10" creationId="{C51C6389-3C88-4831-B1A9-168BE13CABD4}"/>
-          </ac:spMkLst>
-        </pc:spChg>
-        <pc:spChg chg="add mod">
-          <ac:chgData name="Kollmannsberger, Stefan" userId="33bc9b04-ebde-45a7-8cb5-2c13f1aad7eb" providerId="ADAL" clId="{101CA44A-33ED-44ED-B039-616EC25DF3F7}" dt="2022-05-02T13:05:28.054" v="8592" actId="790"/>
-          <ac:spMkLst>
-            <pc:docMk/>
-            <pc:sldMk cId="258752027" sldId="463"/>
-            <ac:spMk id="11" creationId="{81BD96D0-2460-4CBB-B6DB-E0FF2072393D}"/>
-          </ac:spMkLst>
-        </pc:spChg>
-        <pc:grpChg chg="add mod">
-          <ac:chgData name="Kollmannsberger, Stefan" userId="33bc9b04-ebde-45a7-8cb5-2c13f1aad7eb" providerId="ADAL" clId="{101CA44A-33ED-44ED-B039-616EC25DF3F7}" dt="2022-05-02T13:19:05.648" v="8733" actId="164"/>
-          <ac:grpSpMkLst>
-            <pc:docMk/>
-            <pc:sldMk cId="258752027" sldId="463"/>
-            <ac:grpSpMk id="5" creationId="{282508F8-C9CF-3040-BE30-DCDB5352B9F2}"/>
-          </ac:grpSpMkLst>
-        </pc:grpChg>
-        <pc:picChg chg="add mod">
-          <ac:chgData name="Kollmannsberger, Stefan" userId="33bc9b04-ebde-45a7-8cb5-2c13f1aad7eb" providerId="ADAL" clId="{101CA44A-33ED-44ED-B039-616EC25DF3F7}" dt="2022-04-12T13:42:05.373" v="4901" actId="14100"/>
-          <ac:picMkLst>
-            <pc:docMk/>
-            <pc:sldMk cId="258752027" sldId="463"/>
-            <ac:picMk id="6" creationId="{294CC791-F79B-4614-B5BC-1927B422D190}"/>
-          </ac:picMkLst>
-        </pc:picChg>
-        <pc:picChg chg="add mod">
-          <ac:chgData name="Kollmannsberger, Stefan" userId="33bc9b04-ebde-45a7-8cb5-2c13f1aad7eb" providerId="ADAL" clId="{101CA44A-33ED-44ED-B039-616EC25DF3F7}" dt="2022-05-02T13:19:05.648" v="8733" actId="164"/>
-          <ac:picMkLst>
-            <pc:docMk/>
-            <pc:sldMk cId="258752027" sldId="463"/>
-            <ac:picMk id="8" creationId="{730ED858-0BD1-4287-B9A4-09F01641E51E}"/>
-          </ac:picMkLst>
-        </pc:picChg>
       </pc:sldChg>
       <pc:sldChg chg="addSp delSp modSp new mod ord">
         <pc:chgData name="Kollmannsberger, Stefan" userId="33bc9b04-ebde-45a7-8cb5-2c13f1aad7eb" providerId="ADAL" clId="{101CA44A-33ED-44ED-B039-616EC25DF3F7}" dt="2022-04-30T13:54:07.024" v="5149"/>
@@ -1327,30 +382,6 @@
           <pc:docMk/>
           <pc:sldMk cId="4044912545" sldId="464"/>
         </pc:sldMkLst>
-        <pc:spChg chg="del">
-          <ac:chgData name="Kollmannsberger, Stefan" userId="33bc9b04-ebde-45a7-8cb5-2c13f1aad7eb" providerId="ADAL" clId="{101CA44A-33ED-44ED-B039-616EC25DF3F7}" dt="2022-04-12T13:47:32.113" v="4989" actId="478"/>
-          <ac:spMkLst>
-            <pc:docMk/>
-            <pc:sldMk cId="4044912545" sldId="464"/>
-            <ac:spMk id="2" creationId="{80B0C0E0-1A2B-4C2E-A95E-CC15B897165F}"/>
-          </ac:spMkLst>
-        </pc:spChg>
-        <pc:spChg chg="mod">
-          <ac:chgData name="Kollmannsberger, Stefan" userId="33bc9b04-ebde-45a7-8cb5-2c13f1aad7eb" providerId="ADAL" clId="{101CA44A-33ED-44ED-B039-616EC25DF3F7}" dt="2022-04-12T13:47:40.895" v="5003" actId="20577"/>
-          <ac:spMkLst>
-            <pc:docMk/>
-            <pc:sldMk cId="4044912545" sldId="464"/>
-            <ac:spMk id="3" creationId="{4285E94A-605D-4AC6-8CF1-FD557ED02D54}"/>
-          </ac:spMkLst>
-        </pc:spChg>
-        <pc:picChg chg="add">
-          <ac:chgData name="Kollmannsberger, Stefan" userId="33bc9b04-ebde-45a7-8cb5-2c13f1aad7eb" providerId="ADAL" clId="{101CA44A-33ED-44ED-B039-616EC25DF3F7}" dt="2022-04-12T13:47:33.708" v="4990" actId="22"/>
-          <ac:picMkLst>
-            <pc:docMk/>
-            <pc:sldMk cId="4044912545" sldId="464"/>
-            <ac:picMk id="6" creationId="{547B3F9B-C020-42EC-904F-D98F1A3467AB}"/>
-          </ac:picMkLst>
-        </pc:picChg>
       </pc:sldChg>
       <pc:sldChg chg="modSp new del mod ord">
         <pc:chgData name="Kollmannsberger, Stefan" userId="33bc9b04-ebde-45a7-8cb5-2c13f1aad7eb" providerId="ADAL" clId="{101CA44A-33ED-44ED-B039-616EC25DF3F7}" dt="2022-05-02T13:35:29.555" v="8962" actId="47"/>
@@ -1358,14 +389,6 @@
           <pc:docMk/>
           <pc:sldMk cId="782359219" sldId="465"/>
         </pc:sldMkLst>
-        <pc:spChg chg="mod">
-          <ac:chgData name="Kollmannsberger, Stefan" userId="33bc9b04-ebde-45a7-8cb5-2c13f1aad7eb" providerId="ADAL" clId="{101CA44A-33ED-44ED-B039-616EC25DF3F7}" dt="2022-05-02T13:35:25.298" v="8961" actId="20577"/>
-          <ac:spMkLst>
-            <pc:docMk/>
-            <pc:sldMk cId="782359219" sldId="465"/>
-            <ac:spMk id="3" creationId="{0D6D9D17-3799-48CB-BF8B-4EF7A4E17C31}"/>
-          </ac:spMkLst>
-        </pc:spChg>
       </pc:sldChg>
       <pc:sldChg chg="add del">
         <pc:chgData name="Kollmannsberger, Stefan" userId="33bc9b04-ebde-45a7-8cb5-2c13f1aad7eb" providerId="ADAL" clId="{101CA44A-33ED-44ED-B039-616EC25DF3F7}" dt="2022-04-30T13:51:47.150" v="5112" actId="47"/>
@@ -1380,78 +403,6 @@
           <pc:docMk/>
           <pc:sldMk cId="316594514" sldId="466"/>
         </pc:sldMkLst>
-        <pc:spChg chg="del">
-          <ac:chgData name="Kollmannsberger, Stefan" userId="33bc9b04-ebde-45a7-8cb5-2c13f1aad7eb" providerId="ADAL" clId="{101CA44A-33ED-44ED-B039-616EC25DF3F7}" dt="2022-04-30T14:19:15.468" v="5951" actId="478"/>
-          <ac:spMkLst>
-            <pc:docMk/>
-            <pc:sldMk cId="316594514" sldId="466"/>
-            <ac:spMk id="2" creationId="{00000000-0000-0000-0000-000000000000}"/>
-          </ac:spMkLst>
-        </pc:spChg>
-        <pc:spChg chg="add del mod">
-          <ac:chgData name="Kollmannsberger, Stefan" userId="33bc9b04-ebde-45a7-8cb5-2c13f1aad7eb" providerId="ADAL" clId="{101CA44A-33ED-44ED-B039-616EC25DF3F7}" dt="2022-04-30T14:19:18.183" v="5952" actId="478"/>
-          <ac:spMkLst>
-            <pc:docMk/>
-            <pc:sldMk cId="316594514" sldId="466"/>
-            <ac:spMk id="7" creationId="{07D9DE54-5BE7-4067-8C0A-7CDC3577E4B8}"/>
-          </ac:spMkLst>
-        </pc:spChg>
-        <pc:spChg chg="add del">
-          <ac:chgData name="Kollmannsberger, Stefan" userId="33bc9b04-ebde-45a7-8cb5-2c13f1aad7eb" providerId="ADAL" clId="{101CA44A-33ED-44ED-B039-616EC25DF3F7}" dt="2022-04-30T14:19:08.601" v="5950" actId="478"/>
-          <ac:spMkLst>
-            <pc:docMk/>
-            <pc:sldMk cId="316594514" sldId="466"/>
-            <ac:spMk id="14" creationId="{EDC2EA70-6F99-4FD8-99F3-4CC99F63E76E}"/>
-          </ac:spMkLst>
-        </pc:spChg>
-        <pc:spChg chg="add mod">
-          <ac:chgData name="Kollmannsberger, Stefan" userId="33bc9b04-ebde-45a7-8cb5-2c13f1aad7eb" providerId="ADAL" clId="{101CA44A-33ED-44ED-B039-616EC25DF3F7}" dt="2022-04-30T14:37:45.978" v="6811" actId="255"/>
-          <ac:spMkLst>
-            <pc:docMk/>
-            <pc:sldMk cId="316594514" sldId="466"/>
-            <ac:spMk id="15" creationId="{72C2A8A7-F09C-4E4C-A709-858284BC14A5}"/>
-          </ac:spMkLst>
-        </pc:spChg>
-        <pc:picChg chg="del">
-          <ac:chgData name="Kollmannsberger, Stefan" userId="33bc9b04-ebde-45a7-8cb5-2c13f1aad7eb" providerId="ADAL" clId="{101CA44A-33ED-44ED-B039-616EC25DF3F7}" dt="2022-04-30T14:19:01.127" v="5946" actId="478"/>
-          <ac:picMkLst>
-            <pc:docMk/>
-            <pc:sldMk cId="316594514" sldId="466"/>
-            <ac:picMk id="6" creationId="{DE7EBD97-CC9E-4249-AC31-F83ED732AE8F}"/>
-          </ac:picMkLst>
-        </pc:picChg>
-        <pc:picChg chg="del">
-          <ac:chgData name="Kollmannsberger, Stefan" userId="33bc9b04-ebde-45a7-8cb5-2c13f1aad7eb" providerId="ADAL" clId="{101CA44A-33ED-44ED-B039-616EC25DF3F7}" dt="2022-04-30T14:19:03.509" v="5948" actId="478"/>
-          <ac:picMkLst>
-            <pc:docMk/>
-            <pc:sldMk cId="316594514" sldId="466"/>
-            <ac:picMk id="8" creationId="{9AD8CB03-E795-4EFA-AC55-81FC83746ADF}"/>
-          </ac:picMkLst>
-        </pc:picChg>
-        <pc:picChg chg="add mod">
-          <ac:chgData name="Kollmannsberger, Stefan" userId="33bc9b04-ebde-45a7-8cb5-2c13f1aad7eb" providerId="ADAL" clId="{101CA44A-33ED-44ED-B039-616EC25DF3F7}" dt="2022-04-30T14:20:53.669" v="5956" actId="1035"/>
-          <ac:picMkLst>
-            <pc:docMk/>
-            <pc:sldMk cId="316594514" sldId="466"/>
-            <ac:picMk id="10" creationId="{639AD4A2-9AD4-49D5-B9D8-AF89787FBF26}"/>
-          </ac:picMkLst>
-        </pc:picChg>
-        <pc:picChg chg="del">
-          <ac:chgData name="Kollmannsberger, Stefan" userId="33bc9b04-ebde-45a7-8cb5-2c13f1aad7eb" providerId="ADAL" clId="{101CA44A-33ED-44ED-B039-616EC25DF3F7}" dt="2022-04-30T14:19:02.236" v="5947" actId="478"/>
-          <ac:picMkLst>
-            <pc:docMk/>
-            <pc:sldMk cId="316594514" sldId="466"/>
-            <ac:picMk id="12" creationId="{C86A6D25-2735-4951-87E2-BEE3E14AA159}"/>
-          </ac:picMkLst>
-        </pc:picChg>
-        <pc:picChg chg="add del mod">
-          <ac:chgData name="Kollmannsberger, Stefan" userId="33bc9b04-ebde-45a7-8cb5-2c13f1aad7eb" providerId="ADAL" clId="{101CA44A-33ED-44ED-B039-616EC25DF3F7}" dt="2022-04-30T14:27:14.949" v="6187" actId="478"/>
-          <ac:picMkLst>
-            <pc:docMk/>
-            <pc:sldMk cId="316594514" sldId="466"/>
-            <ac:picMk id="16" creationId="{3D84D11E-D53A-48C5-8A0B-ABB07C5BEED5}"/>
-          </ac:picMkLst>
-        </pc:picChg>
       </pc:sldChg>
       <pc:sldChg chg="modSp add mod">
         <pc:chgData name="Kollmannsberger, Stefan" userId="33bc9b04-ebde-45a7-8cb5-2c13f1aad7eb" providerId="ADAL" clId="{101CA44A-33ED-44ED-B039-616EC25DF3F7}" dt="2022-04-30T14:37:54.491" v="6812" actId="255"/>
@@ -1459,22 +410,6 @@
           <pc:docMk/>
           <pc:sldMk cId="336659923" sldId="467"/>
         </pc:sldMkLst>
-        <pc:spChg chg="mod">
-          <ac:chgData name="Kollmannsberger, Stefan" userId="33bc9b04-ebde-45a7-8cb5-2c13f1aad7eb" providerId="ADAL" clId="{101CA44A-33ED-44ED-B039-616EC25DF3F7}" dt="2022-04-30T14:37:54.491" v="6812" actId="255"/>
-          <ac:spMkLst>
-            <pc:docMk/>
-            <pc:sldMk cId="336659923" sldId="467"/>
-            <ac:spMk id="15" creationId="{72C2A8A7-F09C-4E4C-A709-858284BC14A5}"/>
-          </ac:spMkLst>
-        </pc:spChg>
-        <pc:picChg chg="mod">
-          <ac:chgData name="Kollmannsberger, Stefan" userId="33bc9b04-ebde-45a7-8cb5-2c13f1aad7eb" providerId="ADAL" clId="{101CA44A-33ED-44ED-B039-616EC25DF3F7}" dt="2022-04-30T14:28:00.409" v="6291" actId="1035"/>
-          <ac:picMkLst>
-            <pc:docMk/>
-            <pc:sldMk cId="336659923" sldId="467"/>
-            <ac:picMk id="16" creationId="{3D84D11E-D53A-48C5-8A0B-ABB07C5BEED5}"/>
-          </ac:picMkLst>
-        </pc:picChg>
       </pc:sldChg>
       <pc:sldChg chg="addSp modSp add mod">
         <pc:chgData name="Kollmannsberger, Stefan" userId="33bc9b04-ebde-45a7-8cb5-2c13f1aad7eb" providerId="ADAL" clId="{101CA44A-33ED-44ED-B039-616EC25DF3F7}" dt="2022-04-30T14:38:13.513" v="6820" actId="1036"/>
@@ -1482,22 +417,6 @@
           <pc:docMk/>
           <pc:sldMk cId="602189038" sldId="468"/>
         </pc:sldMkLst>
-        <pc:spChg chg="mod">
-          <ac:chgData name="Kollmannsberger, Stefan" userId="33bc9b04-ebde-45a7-8cb5-2c13f1aad7eb" providerId="ADAL" clId="{101CA44A-33ED-44ED-B039-616EC25DF3F7}" dt="2022-04-30T14:38:13.513" v="6820" actId="1036"/>
-          <ac:spMkLst>
-            <pc:docMk/>
-            <pc:sldMk cId="602189038" sldId="468"/>
-            <ac:spMk id="15" creationId="{72C2A8A7-F09C-4E4C-A709-858284BC14A5}"/>
-          </ac:spMkLst>
-        </pc:spChg>
-        <pc:picChg chg="add mod">
-          <ac:chgData name="Kollmannsberger, Stefan" userId="33bc9b04-ebde-45a7-8cb5-2c13f1aad7eb" providerId="ADAL" clId="{101CA44A-33ED-44ED-B039-616EC25DF3F7}" dt="2022-04-30T14:34:04.749" v="6709" actId="1035"/>
-          <ac:picMkLst>
-            <pc:docMk/>
-            <pc:sldMk cId="602189038" sldId="468"/>
-            <ac:picMk id="5" creationId="{C8B83F5E-1F90-44E7-86F2-4CC679271452}"/>
-          </ac:picMkLst>
-        </pc:picChg>
       </pc:sldChg>
       <pc:sldChg chg="addSp modSp add mod">
         <pc:chgData name="Kollmannsberger, Stefan" userId="33bc9b04-ebde-45a7-8cb5-2c13f1aad7eb" providerId="ADAL" clId="{101CA44A-33ED-44ED-B039-616EC25DF3F7}" dt="2022-04-30T14:38:25.986" v="6822" actId="20577"/>
@@ -1505,22 +424,6 @@
           <pc:docMk/>
           <pc:sldMk cId="1609026192" sldId="469"/>
         </pc:sldMkLst>
-        <pc:spChg chg="mod">
-          <ac:chgData name="Kollmannsberger, Stefan" userId="33bc9b04-ebde-45a7-8cb5-2c13f1aad7eb" providerId="ADAL" clId="{101CA44A-33ED-44ED-B039-616EC25DF3F7}" dt="2022-04-30T14:38:25.986" v="6822" actId="20577"/>
-          <ac:spMkLst>
-            <pc:docMk/>
-            <pc:sldMk cId="1609026192" sldId="469"/>
-            <ac:spMk id="15" creationId="{72C2A8A7-F09C-4E4C-A709-858284BC14A5}"/>
-          </ac:spMkLst>
-        </pc:spChg>
-        <pc:picChg chg="add mod">
-          <ac:chgData name="Kollmannsberger, Stefan" userId="33bc9b04-ebde-45a7-8cb5-2c13f1aad7eb" providerId="ADAL" clId="{101CA44A-33ED-44ED-B039-616EC25DF3F7}" dt="2022-04-30T14:34:38.025" v="6712" actId="1076"/>
-          <ac:picMkLst>
-            <pc:docMk/>
-            <pc:sldMk cId="1609026192" sldId="469"/>
-            <ac:picMk id="6" creationId="{D721F22D-1C4E-4530-8BB4-19055C53983A}"/>
-          </ac:picMkLst>
-        </pc:picChg>
       </pc:sldChg>
       <pc:sldChg chg="addSp modSp add mod modNotesTx">
         <pc:chgData name="Kollmannsberger, Stefan" userId="33bc9b04-ebde-45a7-8cb5-2c13f1aad7eb" providerId="ADAL" clId="{101CA44A-33ED-44ED-B039-616EC25DF3F7}" dt="2022-04-30T14:43:13.361" v="7365" actId="20577"/>
@@ -1528,22 +431,6 @@
           <pc:docMk/>
           <pc:sldMk cId="329748033" sldId="470"/>
         </pc:sldMkLst>
-        <pc:spChg chg="mod">
-          <ac:chgData name="Kollmannsberger, Stefan" userId="33bc9b04-ebde-45a7-8cb5-2c13f1aad7eb" providerId="ADAL" clId="{101CA44A-33ED-44ED-B039-616EC25DF3F7}" dt="2022-04-30T14:41:01.250" v="6887" actId="20577"/>
-          <ac:spMkLst>
-            <pc:docMk/>
-            <pc:sldMk cId="329748033" sldId="470"/>
-            <ac:spMk id="15" creationId="{72C2A8A7-F09C-4E4C-A709-858284BC14A5}"/>
-          </ac:spMkLst>
-        </pc:spChg>
-        <pc:picChg chg="add mod">
-          <ac:chgData name="Kollmannsberger, Stefan" userId="33bc9b04-ebde-45a7-8cb5-2c13f1aad7eb" providerId="ADAL" clId="{101CA44A-33ED-44ED-B039-616EC25DF3F7}" dt="2022-04-30T14:39:25.586" v="6825" actId="1076"/>
-          <ac:picMkLst>
-            <pc:docMk/>
-            <pc:sldMk cId="329748033" sldId="470"/>
-            <ac:picMk id="7" creationId="{379C4895-77A0-4A8F-82CB-89A8CBC81FF3}"/>
-          </ac:picMkLst>
-        </pc:picChg>
       </pc:sldChg>
       <pc:sldChg chg="addSp modSp new mod">
         <pc:chgData name="Kollmannsberger, Stefan" userId="33bc9b04-ebde-45a7-8cb5-2c13f1aad7eb" providerId="ADAL" clId="{101CA44A-33ED-44ED-B039-616EC25DF3F7}" dt="2022-04-30T15:00:59.422" v="7597" actId="14100"/>
@@ -1551,46 +438,6 @@
           <pc:docMk/>
           <pc:sldMk cId="425137606" sldId="471"/>
         </pc:sldMkLst>
-        <pc:spChg chg="mod">
-          <ac:chgData name="Kollmannsberger, Stefan" userId="33bc9b04-ebde-45a7-8cb5-2c13f1aad7eb" providerId="ADAL" clId="{101CA44A-33ED-44ED-B039-616EC25DF3F7}" dt="2022-04-30T15:00:59.422" v="7597" actId="14100"/>
-          <ac:spMkLst>
-            <pc:docMk/>
-            <pc:sldMk cId="425137606" sldId="471"/>
-            <ac:spMk id="2" creationId="{5DEE2876-3B20-4975-9A90-51186CDFED02}"/>
-          </ac:spMkLst>
-        </pc:spChg>
-        <pc:spChg chg="mod">
-          <ac:chgData name="Kollmannsberger, Stefan" userId="33bc9b04-ebde-45a7-8cb5-2c13f1aad7eb" providerId="ADAL" clId="{101CA44A-33ED-44ED-B039-616EC25DF3F7}" dt="2022-04-30T14:47:39.030" v="7425" actId="20577"/>
-          <ac:spMkLst>
-            <pc:docMk/>
-            <pc:sldMk cId="425137606" sldId="471"/>
-            <ac:spMk id="3" creationId="{0E76BD87-43A1-46CE-8838-CEC88ED8F4C1}"/>
-          </ac:spMkLst>
-        </pc:spChg>
-        <pc:spChg chg="add mod">
-          <ac:chgData name="Kollmannsberger, Stefan" userId="33bc9b04-ebde-45a7-8cb5-2c13f1aad7eb" providerId="ADAL" clId="{101CA44A-33ED-44ED-B039-616EC25DF3F7}" dt="2022-04-30T15:00:32.562" v="7571" actId="21"/>
-          <ac:spMkLst>
-            <pc:docMk/>
-            <pc:sldMk cId="425137606" sldId="471"/>
-            <ac:spMk id="7" creationId="{D9BB61F5-FDA2-4478-9DA6-278CFB9EF2FB}"/>
-          </ac:spMkLst>
-        </pc:spChg>
-        <pc:spChg chg="add mod">
-          <ac:chgData name="Kollmannsberger, Stefan" userId="33bc9b04-ebde-45a7-8cb5-2c13f1aad7eb" providerId="ADAL" clId="{101CA44A-33ED-44ED-B039-616EC25DF3F7}" dt="2022-04-30T14:59:54.238" v="7540" actId="14100"/>
-          <ac:spMkLst>
-            <pc:docMk/>
-            <pc:sldMk cId="425137606" sldId="471"/>
-            <ac:spMk id="9" creationId="{ACA72F50-3958-48B4-BE92-20239E2493A5}"/>
-          </ac:spMkLst>
-        </pc:spChg>
-        <pc:picChg chg="add mod">
-          <ac:chgData name="Kollmannsberger, Stefan" userId="33bc9b04-ebde-45a7-8cb5-2c13f1aad7eb" providerId="ADAL" clId="{101CA44A-33ED-44ED-B039-616EC25DF3F7}" dt="2022-04-30T15:00:40.902" v="7572" actId="14100"/>
-          <ac:picMkLst>
-            <pc:docMk/>
-            <pc:sldMk cId="425137606" sldId="471"/>
-            <ac:picMk id="6" creationId="{1ED46A38-D556-4CA6-B91C-67079722CBDB}"/>
-          </ac:picMkLst>
-        </pc:picChg>
       </pc:sldChg>
       <pc:sldChg chg="addSp delSp modSp add mod modNotesTx">
         <pc:chgData name="Kollmannsberger, Stefan" userId="33bc9b04-ebde-45a7-8cb5-2c13f1aad7eb" providerId="ADAL" clId="{101CA44A-33ED-44ED-B039-616EC25DF3F7}" dt="2022-04-30T15:08:02.744" v="7710" actId="20577"/>
@@ -1598,46 +445,6 @@
           <pc:docMk/>
           <pc:sldMk cId="2774932163" sldId="472"/>
         </pc:sldMkLst>
-        <pc:spChg chg="del">
-          <ac:chgData name="Kollmannsberger, Stefan" userId="33bc9b04-ebde-45a7-8cb5-2c13f1aad7eb" providerId="ADAL" clId="{101CA44A-33ED-44ED-B039-616EC25DF3F7}" dt="2022-04-30T15:01:27.848" v="7627" actId="478"/>
-          <ac:spMkLst>
-            <pc:docMk/>
-            <pc:sldMk cId="2774932163" sldId="472"/>
-            <ac:spMk id="2" creationId="{5DEE2876-3B20-4975-9A90-51186CDFED02}"/>
-          </ac:spMkLst>
-        </pc:spChg>
-        <pc:spChg chg="mod">
-          <ac:chgData name="Kollmannsberger, Stefan" userId="33bc9b04-ebde-45a7-8cb5-2c13f1aad7eb" providerId="ADAL" clId="{101CA44A-33ED-44ED-B039-616EC25DF3F7}" dt="2022-04-30T15:01:22.696" v="7626" actId="20577"/>
-          <ac:spMkLst>
-            <pc:docMk/>
-            <pc:sldMk cId="2774932163" sldId="472"/>
-            <ac:spMk id="7" creationId="{D9BB61F5-FDA2-4478-9DA6-278CFB9EF2FB}"/>
-          </ac:spMkLst>
-        </pc:spChg>
-        <pc:spChg chg="add del mod">
-          <ac:chgData name="Kollmannsberger, Stefan" userId="33bc9b04-ebde-45a7-8cb5-2c13f1aad7eb" providerId="ADAL" clId="{101CA44A-33ED-44ED-B039-616EC25DF3F7}" dt="2022-04-30T15:01:30.445" v="7628" actId="478"/>
-          <ac:spMkLst>
-            <pc:docMk/>
-            <pc:sldMk cId="2774932163" sldId="472"/>
-            <ac:spMk id="8" creationId="{E66B0363-A978-49EA-B7AC-E5F35720849F}"/>
-          </ac:spMkLst>
-        </pc:spChg>
-        <pc:graphicFrameChg chg="add mod">
-          <ac:chgData name="Kollmannsberger, Stefan" userId="33bc9b04-ebde-45a7-8cb5-2c13f1aad7eb" providerId="ADAL" clId="{101CA44A-33ED-44ED-B039-616EC25DF3F7}" dt="2022-04-30T15:07:40.454" v="7631" actId="1076"/>
-          <ac:graphicFrameMkLst>
-            <pc:docMk/>
-            <pc:sldMk cId="2774932163" sldId="472"/>
-            <ac:graphicFrameMk id="10" creationId="{4B66C3C7-4950-461F-BD8C-7009A6EC6815}"/>
-          </ac:graphicFrameMkLst>
-        </pc:graphicFrameChg>
-        <pc:picChg chg="del">
-          <ac:chgData name="Kollmannsberger, Stefan" userId="33bc9b04-ebde-45a7-8cb5-2c13f1aad7eb" providerId="ADAL" clId="{101CA44A-33ED-44ED-B039-616EC25DF3F7}" dt="2022-04-30T15:01:13.938" v="7599" actId="478"/>
-          <ac:picMkLst>
-            <pc:docMk/>
-            <pc:sldMk cId="2774932163" sldId="472"/>
-            <ac:picMk id="6" creationId="{1ED46A38-D556-4CA6-B91C-67079722CBDB}"/>
-          </ac:picMkLst>
-        </pc:picChg>
       </pc:sldChg>
       <pc:sldChg chg="addSp delSp modSp add mod">
         <pc:chgData name="Kollmannsberger, Stefan" userId="33bc9b04-ebde-45a7-8cb5-2c13f1aad7eb" providerId="ADAL" clId="{101CA44A-33ED-44ED-B039-616EC25DF3F7}" dt="2022-05-02T13:28:58.478" v="8904" actId="313"/>
@@ -1645,62 +452,6 @@
           <pc:docMk/>
           <pc:sldMk cId="3993411997" sldId="473"/>
         </pc:sldMkLst>
-        <pc:spChg chg="mod">
-          <ac:chgData name="Kollmannsberger, Stefan" userId="33bc9b04-ebde-45a7-8cb5-2c13f1aad7eb" providerId="ADAL" clId="{101CA44A-33ED-44ED-B039-616EC25DF3F7}" dt="2022-04-30T15:23:58.907" v="8074" actId="790"/>
-          <ac:spMkLst>
-            <pc:docMk/>
-            <pc:sldMk cId="3993411997" sldId="473"/>
-            <ac:spMk id="3" creationId="{0E76BD87-43A1-46CE-8838-CEC88ED8F4C1}"/>
-          </ac:spMkLst>
-        </pc:spChg>
-        <pc:spChg chg="mod">
-          <ac:chgData name="Kollmannsberger, Stefan" userId="33bc9b04-ebde-45a7-8cb5-2c13f1aad7eb" providerId="ADAL" clId="{101CA44A-33ED-44ED-B039-616EC25DF3F7}" dt="2022-04-30T15:23:58.907" v="8074" actId="790"/>
-          <ac:spMkLst>
-            <pc:docMk/>
-            <pc:sldMk cId="3993411997" sldId="473"/>
-            <ac:spMk id="4" creationId="{DE7DF257-630E-4776-AE54-401B0EED49A9}"/>
-          </ac:spMkLst>
-        </pc:spChg>
-        <pc:spChg chg="mod">
-          <ac:chgData name="Kollmannsberger, Stefan" userId="33bc9b04-ebde-45a7-8cb5-2c13f1aad7eb" providerId="ADAL" clId="{101CA44A-33ED-44ED-B039-616EC25DF3F7}" dt="2022-05-02T13:28:58.478" v="8904" actId="313"/>
-          <ac:spMkLst>
-            <pc:docMk/>
-            <pc:sldMk cId="3993411997" sldId="473"/>
-            <ac:spMk id="7" creationId="{D9BB61F5-FDA2-4478-9DA6-278CFB9EF2FB}"/>
-          </ac:spMkLst>
-        </pc:spChg>
-        <pc:spChg chg="add mod">
-          <ac:chgData name="Kollmannsberger, Stefan" userId="33bc9b04-ebde-45a7-8cb5-2c13f1aad7eb" providerId="ADAL" clId="{101CA44A-33ED-44ED-B039-616EC25DF3F7}" dt="2022-04-30T15:24:38.348" v="8120" actId="20577"/>
-          <ac:spMkLst>
-            <pc:docMk/>
-            <pc:sldMk cId="3993411997" sldId="473"/>
-            <ac:spMk id="8" creationId="{85312DB2-3B72-4B4A-8DA5-03DBA26BE36E}"/>
-          </ac:spMkLst>
-        </pc:spChg>
-        <pc:spChg chg="mod">
-          <ac:chgData name="Kollmannsberger, Stefan" userId="33bc9b04-ebde-45a7-8cb5-2c13f1aad7eb" providerId="ADAL" clId="{101CA44A-33ED-44ED-B039-616EC25DF3F7}" dt="2022-04-30T15:25:01.551" v="8122" actId="20577"/>
-          <ac:spMkLst>
-            <pc:docMk/>
-            <pc:sldMk cId="3993411997" sldId="473"/>
-            <ac:spMk id="9" creationId="{ACA72F50-3958-48B4-BE92-20239E2493A5}"/>
-          </ac:spMkLst>
-        </pc:spChg>
-        <pc:spChg chg="add mod">
-          <ac:chgData name="Kollmannsberger, Stefan" userId="33bc9b04-ebde-45a7-8cb5-2c13f1aad7eb" providerId="ADAL" clId="{101CA44A-33ED-44ED-B039-616EC25DF3F7}" dt="2022-04-30T15:25:53.381" v="8165" actId="20577"/>
-          <ac:spMkLst>
-            <pc:docMk/>
-            <pc:sldMk cId="3993411997" sldId="473"/>
-            <ac:spMk id="11" creationId="{D0B51F51-6E0F-4422-A47D-BB08CEFF3CCA}"/>
-          </ac:spMkLst>
-        </pc:spChg>
-        <pc:graphicFrameChg chg="del">
-          <ac:chgData name="Kollmannsberger, Stefan" userId="33bc9b04-ebde-45a7-8cb5-2c13f1aad7eb" providerId="ADAL" clId="{101CA44A-33ED-44ED-B039-616EC25DF3F7}" dt="2022-04-30T15:08:10.677" v="7712" actId="478"/>
-          <ac:graphicFrameMkLst>
-            <pc:docMk/>
-            <pc:sldMk cId="3993411997" sldId="473"/>
-            <ac:graphicFrameMk id="10" creationId="{4B66C3C7-4950-461F-BD8C-7009A6EC6815}"/>
-          </ac:graphicFrameMkLst>
-        </pc:graphicFrameChg>
       </pc:sldChg>
       <pc:sldChg chg="delSp modSp add mod modAnim">
         <pc:chgData name="Kollmannsberger, Stefan" userId="33bc9b04-ebde-45a7-8cb5-2c13f1aad7eb" providerId="ADAL" clId="{101CA44A-33ED-44ED-B039-616EC25DF3F7}" dt="2022-05-02T13:35:49.895" v="8965" actId="313"/>
@@ -1708,30 +459,6 @@
           <pc:docMk/>
           <pc:sldMk cId="3439942829" sldId="474"/>
         </pc:sldMkLst>
-        <pc:spChg chg="mod">
-          <ac:chgData name="Kollmannsberger, Stefan" userId="33bc9b04-ebde-45a7-8cb5-2c13f1aad7eb" providerId="ADAL" clId="{101CA44A-33ED-44ED-B039-616EC25DF3F7}" dt="2022-05-02T13:29:23.266" v="8906" actId="313"/>
-          <ac:spMkLst>
-            <pc:docMk/>
-            <pc:sldMk cId="3439942829" sldId="474"/>
-            <ac:spMk id="7" creationId="{D9BB61F5-FDA2-4478-9DA6-278CFB9EF2FB}"/>
-          </ac:spMkLst>
-        </pc:spChg>
-        <pc:spChg chg="mod">
-          <ac:chgData name="Kollmannsberger, Stefan" userId="33bc9b04-ebde-45a7-8cb5-2c13f1aad7eb" providerId="ADAL" clId="{101CA44A-33ED-44ED-B039-616EC25DF3F7}" dt="2022-05-02T13:35:49.895" v="8965" actId="313"/>
-          <ac:spMkLst>
-            <pc:docMk/>
-            <pc:sldMk cId="3439942829" sldId="474"/>
-            <ac:spMk id="8" creationId="{85312DB2-3B72-4B4A-8DA5-03DBA26BE36E}"/>
-          </ac:spMkLst>
-        </pc:spChg>
-        <pc:spChg chg="del">
-          <ac:chgData name="Kollmannsberger, Stefan" userId="33bc9b04-ebde-45a7-8cb5-2c13f1aad7eb" providerId="ADAL" clId="{101CA44A-33ED-44ED-B039-616EC25DF3F7}" dt="2022-05-02T13:29:37.708" v="8909" actId="478"/>
-          <ac:spMkLst>
-            <pc:docMk/>
-            <pc:sldMk cId="3439942829" sldId="474"/>
-            <ac:spMk id="9" creationId="{ACA72F50-3958-48B4-BE92-20239E2493A5}"/>
-          </ac:spMkLst>
-        </pc:spChg>
       </pc:sldChg>
       <pc:sldChg chg="addSp delSp modSp add mod modAnim modNotesTx">
         <pc:chgData name="Kollmannsberger, Stefan" userId="33bc9b04-ebde-45a7-8cb5-2c13f1aad7eb" providerId="ADAL" clId="{101CA44A-33ED-44ED-B039-616EC25DF3F7}" dt="2022-05-02T13:35:01.814" v="8934"/>
@@ -1739,70 +466,6 @@
           <pc:docMk/>
           <pc:sldMk cId="392544169" sldId="475"/>
         </pc:sldMkLst>
-        <pc:spChg chg="mod">
-          <ac:chgData name="Kollmannsberger, Stefan" userId="33bc9b04-ebde-45a7-8cb5-2c13f1aad7eb" providerId="ADAL" clId="{101CA44A-33ED-44ED-B039-616EC25DF3F7}" dt="2022-04-30T15:26:59.152" v="8188" actId="20577"/>
-          <ac:spMkLst>
-            <pc:docMk/>
-            <pc:sldMk cId="392544169" sldId="475"/>
-            <ac:spMk id="3" creationId="{0E76BD87-43A1-46CE-8838-CEC88ED8F4C1}"/>
-          </ac:spMkLst>
-        </pc:spChg>
-        <pc:spChg chg="del">
-          <ac:chgData name="Kollmannsberger, Stefan" userId="33bc9b04-ebde-45a7-8cb5-2c13f1aad7eb" providerId="ADAL" clId="{101CA44A-33ED-44ED-B039-616EC25DF3F7}" dt="2022-04-30T15:32:31.121" v="8191" actId="478"/>
-          <ac:spMkLst>
-            <pc:docMk/>
-            <pc:sldMk cId="392544169" sldId="475"/>
-            <ac:spMk id="7" creationId="{D9BB61F5-FDA2-4478-9DA6-278CFB9EF2FB}"/>
-          </ac:spMkLst>
-        </pc:spChg>
-        <pc:spChg chg="del">
-          <ac:chgData name="Kollmannsberger, Stefan" userId="33bc9b04-ebde-45a7-8cb5-2c13f1aad7eb" providerId="ADAL" clId="{101CA44A-33ED-44ED-B039-616EC25DF3F7}" dt="2022-04-30T15:27:05.288" v="8189" actId="478"/>
-          <ac:spMkLst>
-            <pc:docMk/>
-            <pc:sldMk cId="392544169" sldId="475"/>
-            <ac:spMk id="8" creationId="{85312DB2-3B72-4B4A-8DA5-03DBA26BE36E}"/>
-          </ac:spMkLst>
-        </pc:spChg>
-        <pc:spChg chg="del">
-          <ac:chgData name="Kollmannsberger, Stefan" userId="33bc9b04-ebde-45a7-8cb5-2c13f1aad7eb" providerId="ADAL" clId="{101CA44A-33ED-44ED-B039-616EC25DF3F7}" dt="2022-04-30T15:33:17.743" v="8194" actId="478"/>
-          <ac:spMkLst>
-            <pc:docMk/>
-            <pc:sldMk cId="392544169" sldId="475"/>
-            <ac:spMk id="9" creationId="{ACA72F50-3958-48B4-BE92-20239E2493A5}"/>
-          </ac:spMkLst>
-        </pc:spChg>
-        <pc:spChg chg="add del">
-          <ac:chgData name="Kollmannsberger, Stefan" userId="33bc9b04-ebde-45a7-8cb5-2c13f1aad7eb" providerId="ADAL" clId="{101CA44A-33ED-44ED-B039-616EC25DF3F7}" dt="2022-04-30T15:32:37.894" v="8193" actId="478"/>
-          <ac:spMkLst>
-            <pc:docMk/>
-            <pc:sldMk cId="392544169" sldId="475"/>
-            <ac:spMk id="10" creationId="{6AB8BBA4-7D31-43D2-B2F9-D2A8360EB782}"/>
-          </ac:spMkLst>
-        </pc:spChg>
-        <pc:spChg chg="del">
-          <ac:chgData name="Kollmannsberger, Stefan" userId="33bc9b04-ebde-45a7-8cb5-2c13f1aad7eb" providerId="ADAL" clId="{101CA44A-33ED-44ED-B039-616EC25DF3F7}" dt="2022-04-30T15:27:07.432" v="8190" actId="478"/>
-          <ac:spMkLst>
-            <pc:docMk/>
-            <pc:sldMk cId="392544169" sldId="475"/>
-            <ac:spMk id="11" creationId="{D0B51F51-6E0F-4422-A47D-BB08CEFF3CCA}"/>
-          </ac:spMkLst>
-        </pc:spChg>
-        <pc:spChg chg="add del">
-          <ac:chgData name="Kollmannsberger, Stefan" userId="33bc9b04-ebde-45a7-8cb5-2c13f1aad7eb" providerId="ADAL" clId="{101CA44A-33ED-44ED-B039-616EC25DF3F7}" dt="2022-04-30T15:33:24.718" v="8196" actId="22"/>
-          <ac:spMkLst>
-            <pc:docMk/>
-            <pc:sldMk cId="392544169" sldId="475"/>
-            <ac:spMk id="12" creationId="{C5014FD4-656A-402B-BB32-B5641750619B}"/>
-          </ac:spMkLst>
-        </pc:spChg>
-        <pc:spChg chg="add mod">
-          <ac:chgData name="Kollmannsberger, Stefan" userId="33bc9b04-ebde-45a7-8cb5-2c13f1aad7eb" providerId="ADAL" clId="{101CA44A-33ED-44ED-B039-616EC25DF3F7}" dt="2022-05-02T13:30:59.507" v="8932" actId="20577"/>
-          <ac:spMkLst>
-            <pc:docMk/>
-            <pc:sldMk cId="392544169" sldId="475"/>
-            <ac:spMk id="13" creationId="{DAAF2898-5E96-476B-89F0-F7181DE5CDEA}"/>
-          </ac:spMkLst>
-        </pc:spChg>
       </pc:sldChg>
       <pc:sldChg chg="addSp delSp modSp add mod">
         <pc:chgData name="Kollmannsberger, Stefan" userId="33bc9b04-ebde-45a7-8cb5-2c13f1aad7eb" providerId="ADAL" clId="{101CA44A-33ED-44ED-B039-616EC25DF3F7}" dt="2022-05-02T13:17:06.491" v="8722" actId="20577"/>
@@ -1810,62 +473,6 @@
           <pc:docMk/>
           <pc:sldMk cId="2922592589" sldId="476"/>
         </pc:sldMkLst>
-        <pc:spChg chg="mod">
-          <ac:chgData name="Kollmannsberger, Stefan" userId="33bc9b04-ebde-45a7-8cb5-2c13f1aad7eb" providerId="ADAL" clId="{101CA44A-33ED-44ED-B039-616EC25DF3F7}" dt="2022-05-02T13:17:06.491" v="8722" actId="20577"/>
-          <ac:spMkLst>
-            <pc:docMk/>
-            <pc:sldMk cId="2922592589" sldId="476"/>
-            <ac:spMk id="3" creationId="{B47C15A1-D146-4322-BEC6-A1F49E001BC2}"/>
-          </ac:spMkLst>
-        </pc:spChg>
-        <pc:spChg chg="add del">
-          <ac:chgData name="Kollmannsberger, Stefan" userId="33bc9b04-ebde-45a7-8cb5-2c13f1aad7eb" providerId="ADAL" clId="{101CA44A-33ED-44ED-B039-616EC25DF3F7}" dt="2022-05-02T12:54:43.700" v="8402" actId="478"/>
-          <ac:spMkLst>
-            <pc:docMk/>
-            <pc:sldMk cId="2922592589" sldId="476"/>
-            <ac:spMk id="7" creationId="{A18DBE60-70A3-4DED-A6E3-15E209DB59D4}"/>
-          </ac:spMkLst>
-        </pc:spChg>
-        <pc:spChg chg="add mod">
-          <ac:chgData name="Kollmannsberger, Stefan" userId="33bc9b04-ebde-45a7-8cb5-2c13f1aad7eb" providerId="ADAL" clId="{101CA44A-33ED-44ED-B039-616EC25DF3F7}" dt="2022-05-02T13:14:43.053" v="8657" actId="1076"/>
-          <ac:spMkLst>
-            <pc:docMk/>
-            <pc:sldMk cId="2922592589" sldId="476"/>
-            <ac:spMk id="14" creationId="{6E75AF1C-8411-80C1-D424-48A64B0735F7}"/>
-          </ac:spMkLst>
-        </pc:spChg>
-        <pc:graphicFrameChg chg="add mod">
-          <ac:chgData name="Kollmannsberger, Stefan" userId="33bc9b04-ebde-45a7-8cb5-2c13f1aad7eb" providerId="ADAL" clId="{101CA44A-33ED-44ED-B039-616EC25DF3F7}" dt="2022-05-02T13:14:50.581" v="8660" actId="14100"/>
-          <ac:graphicFrameMkLst>
-            <pc:docMk/>
-            <pc:sldMk cId="2922592589" sldId="476"/>
-            <ac:graphicFrameMk id="4" creationId="{CCCA9DD7-63D1-AF27-7F16-E31363221713}"/>
-          </ac:graphicFrameMkLst>
-        </pc:graphicFrameChg>
-        <pc:graphicFrameChg chg="add mod">
-          <ac:chgData name="Kollmannsberger, Stefan" userId="33bc9b04-ebde-45a7-8cb5-2c13f1aad7eb" providerId="ADAL" clId="{101CA44A-33ED-44ED-B039-616EC25DF3F7}" dt="2022-05-02T13:14:48.077" v="8659" actId="1076"/>
-          <ac:graphicFrameMkLst>
-            <pc:docMk/>
-            <pc:sldMk cId="2922592589" sldId="476"/>
-            <ac:graphicFrameMk id="6" creationId="{B9B67243-3442-97B2-B26B-6E74DC37ABE1}"/>
-          </ac:graphicFrameMkLst>
-        </pc:graphicFrameChg>
-        <pc:picChg chg="mod">
-          <ac:chgData name="Kollmannsberger, Stefan" userId="33bc9b04-ebde-45a7-8cb5-2c13f1aad7eb" providerId="ADAL" clId="{101CA44A-33ED-44ED-B039-616EC25DF3F7}" dt="2022-05-02T13:14:31.085" v="8656" actId="1076"/>
-          <ac:picMkLst>
-            <pc:docMk/>
-            <pc:sldMk cId="2922592589" sldId="476"/>
-            <ac:picMk id="12" creationId="{CAB6BDE8-2261-4D52-92C1-447FAC7BFB5E}"/>
-          </ac:picMkLst>
-        </pc:picChg>
-        <pc:picChg chg="add mod">
-          <ac:chgData name="Kollmannsberger, Stefan" userId="33bc9b04-ebde-45a7-8cb5-2c13f1aad7eb" providerId="ADAL" clId="{101CA44A-33ED-44ED-B039-616EC25DF3F7}" dt="2022-05-02T13:14:21.733" v="8654" actId="1076"/>
-          <ac:picMkLst>
-            <pc:docMk/>
-            <pc:sldMk cId="2922592589" sldId="476"/>
-            <ac:picMk id="6146" creationId="{07A64134-6638-61E8-E14A-E481D56C2118}"/>
-          </ac:picMkLst>
-        </pc:picChg>
       </pc:sldChg>
       <pc:sldChg chg="new del">
         <pc:chgData name="Kollmannsberger, Stefan" userId="33bc9b04-ebde-45a7-8cb5-2c13f1aad7eb" providerId="ADAL" clId="{101CA44A-33ED-44ED-B039-616EC25DF3F7}" dt="2022-04-30T15:34:03.094" v="8203" actId="47"/>
@@ -1894,24 +501,6 @@
             <pc:sldMasterMk cId="0" sldId="2147483648"/>
             <pc:sldLayoutMk cId="2183948741" sldId="2147483654"/>
           </pc:sldLayoutMkLst>
-          <pc:spChg chg="mod">
-            <ac:chgData name="Kollmannsberger, Stefan" userId="33bc9b04-ebde-45a7-8cb5-2c13f1aad7eb" providerId="ADAL" clId="{101CA44A-33ED-44ED-B039-616EC25DF3F7}" dt="2022-04-12T08:44:11.452" v="294" actId="14100"/>
-            <ac:spMkLst>
-              <pc:docMk/>
-              <pc:sldMasterMk cId="0" sldId="2147483648"/>
-              <pc:sldLayoutMk cId="2183948741" sldId="2147483654"/>
-              <ac:spMk id="3" creationId="{00000000-0000-0000-0000-000000000000}"/>
-            </ac:spMkLst>
-          </pc:spChg>
-          <pc:spChg chg="mod">
-            <ac:chgData name="Kollmannsberger, Stefan" userId="33bc9b04-ebde-45a7-8cb5-2c13f1aad7eb" providerId="ADAL" clId="{101CA44A-33ED-44ED-B039-616EC25DF3F7}" dt="2022-04-12T08:44:06.725" v="293" actId="1035"/>
-            <ac:spMkLst>
-              <pc:docMk/>
-              <pc:sldMasterMk cId="0" sldId="2147483648"/>
-              <pc:sldLayoutMk cId="2183948741" sldId="2147483654"/>
-              <ac:spMk id="10" creationId="{00000000-0000-0000-0000-000000000000}"/>
-            </ac:spMkLst>
-          </pc:spChg>
         </pc:sldLayoutChg>
       </pc:sldMasterChg>
     </pc:docChg>
@@ -2028,7 +617,7 @@
               <a:pPr>
                 <a:defRPr/>
               </a:pPr>
-              <a:t>28/04/2025</a:t>
+              <a:t>24/10/2025</a:t>
             </a:fld>
             <a:endParaRPr lang="en-GB"/>
           </a:p>
@@ -2121,7 +710,7 @@
               <a:pPr>
                 <a:defRPr/>
               </a:pPr>
-              <a:t>‹#›</a:t>
+              <a:t>‹Nr.›</a:t>
             </a:fld>
             <a:endParaRPr lang="en-GB"/>
           </a:p>
@@ -2247,7 +836,7 @@
               <a:pPr>
                 <a:defRPr/>
               </a:pPr>
-              <a:t>28/04/2025</a:t>
+              <a:t>24/10/2025</a:t>
             </a:fld>
             <a:endParaRPr lang="en-GB"/>
           </a:p>
@@ -2439,7 +1028,7 @@
               <a:pPr>
                 <a:defRPr/>
               </a:pPr>
-              <a:t>‹#›</a:t>
+              <a:t>‹Nr.›</a:t>
             </a:fld>
             <a:endParaRPr lang="en-GB"/>
           </a:p>
@@ -2727,7 +1316,7 @@
             <a:fld id="{CE58CB1E-F828-4F11-99E0-327109AF9DA4}" type="slidenum">
               <a:rPr lang="de-DE" smtClean="0"/>
               <a:pPr/>
-              <a:t>‹#›</a:t>
+              <a:t>‹Nr.›</a:t>
             </a:fld>
             <a:endParaRPr lang="de-DE"/>
           </a:p>
@@ -3104,7 +1693,7 @@
             <a:fld id="{CE58CB1E-F828-4F11-99E0-327109AF9DA4}" type="slidenum">
               <a:rPr lang="de-DE" smtClean="0"/>
               <a:pPr/>
-              <a:t>‹#›</a:t>
+              <a:t>‹Nr.›</a:t>
             </a:fld>
             <a:endParaRPr lang="de-DE"/>
           </a:p>
@@ -3391,7 +1980,7 @@
             <a:fld id="{CE58CB1E-F828-4F11-99E0-327109AF9DA4}" type="slidenum">
               <a:rPr lang="de-DE" smtClean="0"/>
               <a:pPr/>
-              <a:t>‹#›</a:t>
+              <a:t>‹Nr.›</a:t>
             </a:fld>
             <a:endParaRPr lang="de-DE"/>
           </a:p>
@@ -3620,7 +2209,7 @@
             <a:fld id="{CE58CB1E-F828-4F11-99E0-327109AF9DA4}" type="slidenum">
               <a:rPr lang="de-DE" smtClean="0"/>
               <a:pPr/>
-              <a:t>‹#›</a:t>
+              <a:t>‹Nr.›</a:t>
             </a:fld>
             <a:endParaRPr lang="de-DE"/>
           </a:p>
@@ -3940,7 +2529,7 @@
             <a:fld id="{CE58CB1E-F828-4F11-99E0-327109AF9DA4}" type="slidenum">
               <a:rPr lang="de-DE" smtClean="0"/>
               <a:pPr/>
-              <a:t>‹#›</a:t>
+              <a:t>‹Nr.›</a:t>
             </a:fld>
             <a:endParaRPr lang="de-DE"/>
           </a:p>
@@ -4543,7 +3132,7 @@
             <a:fld id="{CE58CB1E-F828-4F11-99E0-327109AF9DA4}" type="slidenum">
               <a:rPr lang="de-DE" smtClean="0"/>
               <a:pPr/>
-              <a:t>‹#›</a:t>
+              <a:t>‹Nr.›</a:t>
             </a:fld>
             <a:endParaRPr lang="de-DE"/>
           </a:p>
@@ -6732,8 +5321,8 @@
           <a:chExt cx="0" cy="0"/>
         </a:xfrm>
       </p:grpSpPr>
-      <mc:AlternateContent xmlns:mc="http://schemas.openxmlformats.org/markup-compatibility/2006" xmlns:a14="http://schemas.microsoft.com/office/drawing/2010/main">
-        <mc:Choice Requires="a14">
+      <mc:AlternateContent xmlns:mc="http://schemas.openxmlformats.org/markup-compatibility/2006">
+        <mc:Choice xmlns:a14="http://schemas.microsoft.com/office/drawing/2010/main" Requires="a14">
           <p:sp>
             <p:nvSpPr>
               <p:cNvPr id="2" name="Content Placeholder 1">
@@ -7706,6 +6295,13 @@
                         <m:t>−</m:t>
                       </m:r>
                       <m:r>
+                        <a:rPr lang="de-DE" b="0" i="1" smtClean="0">
+                          <a:latin typeface="Cambria Math" panose="02040503050406030204" pitchFamily="18" charset="0"/>
+                          <a:ea typeface="Cambria Math" panose="02040503050406030204" pitchFamily="18" charset="0"/>
+                        </a:rPr>
+                        <m:t>(</m:t>
+                      </m:r>
+                      <m:r>
                         <a:rPr lang="de-DE" b="1" i="1" smtClean="0">
                           <a:latin typeface="Cambria Math" panose="02040503050406030204" pitchFamily="18" charset="0"/>
                           <a:ea typeface="Cambria Math" panose="02040503050406030204" pitchFamily="18" charset="0"/>
@@ -7773,6 +6369,13 @@
                           <a:ea typeface="Cambria Math" panose="02040503050406030204" pitchFamily="18" charset="0"/>
                         </a:rPr>
                         <m:t>𝑏</m:t>
+                      </m:r>
+                      <m:r>
+                        <a:rPr lang="de-DE" b="0" i="1" smtClean="0">
+                          <a:latin typeface="Cambria Math" panose="02040503050406030204" pitchFamily="18" charset="0"/>
+                          <a:ea typeface="Cambria Math" panose="02040503050406030204" pitchFamily="18" charset="0"/>
+                        </a:rPr>
+                        <m:t>)</m:t>
                       </m:r>
                       <m:sSup>
                         <m:sSupPr>
@@ -8284,7 +6887,7 @@
             </p:txBody>
           </p:sp>
         </mc:Choice>
-        <mc:Fallback xmlns="">
+        <mc:Fallback>
           <p:sp>
             <p:nvSpPr>
               <p:cNvPr id="2" name="Content Placeholder 1">
@@ -8314,7 +6917,7 @@
               <a:lstStyle/>
               <a:p>
                 <a:r>
-                  <a:rPr lang="en-US">
+                  <a:rPr lang="de-DE">
                     <a:noFill/>
                   </a:rPr>
                   <a:t> </a:t>
@@ -8848,398 +7451,6 @@
                                           </p:stCondLst>
                                         </p:cTn>
                                         <p:tgtEl>
-                                          <p:spTgt spid="2">
-                                            <p:txEl>
-                                              <p:pRg st="2" end="2"/>
-                                            </p:txEl>
-                                          </p:spTgt>
-                                        </p:tgtEl>
-                                        <p:attrNameLst>
-                                          <p:attrName>style.visibility</p:attrName>
-                                        </p:attrNameLst>
-                                      </p:cBhvr>
-                                      <p:to>
-                                        <p:strVal val="visible"/>
-                                      </p:to>
-                                    </p:set>
-                                  </p:childTnLst>
-                                </p:cTn>
-                              </p:par>
-                            </p:childTnLst>
-                          </p:cTn>
-                        </p:par>
-                      </p:childTnLst>
-                    </p:cTn>
-                  </p:par>
-                  <p:par>
-                    <p:cTn id="7" fill="hold">
-                      <p:stCondLst>
-                        <p:cond delay="indefinite"/>
-                      </p:stCondLst>
-                      <p:childTnLst>
-                        <p:par>
-                          <p:cTn id="8" fill="hold">
-                            <p:stCondLst>
-                              <p:cond delay="0"/>
-                            </p:stCondLst>
-                            <p:childTnLst>
-                              <p:par>
-                                <p:cTn id="9" presetID="1" presetClass="entr" presetSubtype="0" fill="hold" grpId="0" nodeType="clickEffect">
-                                  <p:stCondLst>
-                                    <p:cond delay="0"/>
-                                  </p:stCondLst>
-                                  <p:childTnLst>
-                                    <p:set>
-                                      <p:cBhvr>
-                                        <p:cTn id="10" dur="1" fill="hold">
-                                          <p:stCondLst>
-                                            <p:cond delay="0"/>
-                                          </p:stCondLst>
-                                        </p:cTn>
-                                        <p:tgtEl>
-                                          <p:spTgt spid="2">
-                                            <p:txEl>
-                                              <p:pRg st="3" end="3"/>
-                                            </p:txEl>
-                                          </p:spTgt>
-                                        </p:tgtEl>
-                                        <p:attrNameLst>
-                                          <p:attrName>style.visibility</p:attrName>
-                                        </p:attrNameLst>
-                                      </p:cBhvr>
-                                      <p:to>
-                                        <p:strVal val="visible"/>
-                                      </p:to>
-                                    </p:set>
-                                  </p:childTnLst>
-                                </p:cTn>
-                              </p:par>
-                            </p:childTnLst>
-                          </p:cTn>
-                        </p:par>
-                      </p:childTnLst>
-                    </p:cTn>
-                  </p:par>
-                  <p:par>
-                    <p:cTn id="11" fill="hold">
-                      <p:stCondLst>
-                        <p:cond delay="indefinite"/>
-                      </p:stCondLst>
-                      <p:childTnLst>
-                        <p:par>
-                          <p:cTn id="12" fill="hold">
-                            <p:stCondLst>
-                              <p:cond delay="0"/>
-                            </p:stCondLst>
-                            <p:childTnLst>
-                              <p:par>
-                                <p:cTn id="13" presetID="1" presetClass="entr" presetSubtype="0" fill="hold" grpId="0" nodeType="clickEffect">
-                                  <p:stCondLst>
-                                    <p:cond delay="0"/>
-                                  </p:stCondLst>
-                                  <p:childTnLst>
-                                    <p:set>
-                                      <p:cBhvr>
-                                        <p:cTn id="14" dur="1" fill="hold">
-                                          <p:stCondLst>
-                                            <p:cond delay="0"/>
-                                          </p:stCondLst>
-                                        </p:cTn>
-                                        <p:tgtEl>
-                                          <p:spTgt spid="2">
-                                            <p:txEl>
-                                              <p:pRg st="4" end="4"/>
-                                            </p:txEl>
-                                          </p:spTgt>
-                                        </p:tgtEl>
-                                        <p:attrNameLst>
-                                          <p:attrName>style.visibility</p:attrName>
-                                        </p:attrNameLst>
-                                      </p:cBhvr>
-                                      <p:to>
-                                        <p:strVal val="visible"/>
-                                      </p:to>
-                                    </p:set>
-                                  </p:childTnLst>
-                                </p:cTn>
-                              </p:par>
-                            </p:childTnLst>
-                          </p:cTn>
-                        </p:par>
-                      </p:childTnLst>
-                    </p:cTn>
-                  </p:par>
-                  <p:par>
-                    <p:cTn id="15" fill="hold">
-                      <p:stCondLst>
-                        <p:cond delay="indefinite"/>
-                      </p:stCondLst>
-                      <p:childTnLst>
-                        <p:par>
-                          <p:cTn id="16" fill="hold">
-                            <p:stCondLst>
-                              <p:cond delay="0"/>
-                            </p:stCondLst>
-                            <p:childTnLst>
-                              <p:par>
-                                <p:cTn id="17" presetID="1" presetClass="entr" presetSubtype="0" fill="hold" grpId="0" nodeType="clickEffect">
-                                  <p:stCondLst>
-                                    <p:cond delay="0"/>
-                                  </p:stCondLst>
-                                  <p:childTnLst>
-                                    <p:set>
-                                      <p:cBhvr>
-                                        <p:cTn id="18" dur="1" fill="hold">
-                                          <p:stCondLst>
-                                            <p:cond delay="0"/>
-                                          </p:stCondLst>
-                                        </p:cTn>
-                                        <p:tgtEl>
-                                          <p:spTgt spid="2">
-                                            <p:txEl>
-                                              <p:pRg st="5" end="5"/>
-                                            </p:txEl>
-                                          </p:spTgt>
-                                        </p:tgtEl>
-                                        <p:attrNameLst>
-                                          <p:attrName>style.visibility</p:attrName>
-                                        </p:attrNameLst>
-                                      </p:cBhvr>
-                                      <p:to>
-                                        <p:strVal val="visible"/>
-                                      </p:to>
-                                    </p:set>
-                                  </p:childTnLst>
-                                </p:cTn>
-                              </p:par>
-                            </p:childTnLst>
-                          </p:cTn>
-                        </p:par>
-                      </p:childTnLst>
-                    </p:cTn>
-                  </p:par>
-                  <p:par>
-                    <p:cTn id="19" fill="hold">
-                      <p:stCondLst>
-                        <p:cond delay="indefinite"/>
-                      </p:stCondLst>
-                      <p:childTnLst>
-                        <p:par>
-                          <p:cTn id="20" fill="hold">
-                            <p:stCondLst>
-                              <p:cond delay="0"/>
-                            </p:stCondLst>
-                            <p:childTnLst>
-                              <p:par>
-                                <p:cTn id="21" presetID="1" presetClass="entr" presetSubtype="0" fill="hold" grpId="0" nodeType="clickEffect">
-                                  <p:stCondLst>
-                                    <p:cond delay="0"/>
-                                  </p:stCondLst>
-                                  <p:childTnLst>
-                                    <p:set>
-                                      <p:cBhvr>
-                                        <p:cTn id="22" dur="1" fill="hold">
-                                          <p:stCondLst>
-                                            <p:cond delay="0"/>
-                                          </p:stCondLst>
-                                        </p:cTn>
-                                        <p:tgtEl>
-                                          <p:spTgt spid="2">
-                                            <p:txEl>
-                                              <p:pRg st="6" end="6"/>
-                                            </p:txEl>
-                                          </p:spTgt>
-                                        </p:tgtEl>
-                                        <p:attrNameLst>
-                                          <p:attrName>style.visibility</p:attrName>
-                                        </p:attrNameLst>
-                                      </p:cBhvr>
-                                      <p:to>
-                                        <p:strVal val="visible"/>
-                                      </p:to>
-                                    </p:set>
-                                  </p:childTnLst>
-                                </p:cTn>
-                              </p:par>
-                            </p:childTnLst>
-                          </p:cTn>
-                        </p:par>
-                      </p:childTnLst>
-                    </p:cTn>
-                  </p:par>
-                  <p:par>
-                    <p:cTn id="23" fill="hold">
-                      <p:stCondLst>
-                        <p:cond delay="indefinite"/>
-                      </p:stCondLst>
-                      <p:childTnLst>
-                        <p:par>
-                          <p:cTn id="24" fill="hold">
-                            <p:stCondLst>
-                              <p:cond delay="0"/>
-                            </p:stCondLst>
-                            <p:childTnLst>
-                              <p:par>
-                                <p:cTn id="25" presetID="1" presetClass="entr" presetSubtype="0" fill="hold" grpId="0" nodeType="clickEffect">
-                                  <p:stCondLst>
-                                    <p:cond delay="0"/>
-                                  </p:stCondLst>
-                                  <p:childTnLst>
-                                    <p:set>
-                                      <p:cBhvr>
-                                        <p:cTn id="26" dur="1" fill="hold">
-                                          <p:stCondLst>
-                                            <p:cond delay="0"/>
-                                          </p:stCondLst>
-                                        </p:cTn>
-                                        <p:tgtEl>
-                                          <p:spTgt spid="2">
-                                            <p:txEl>
-                                              <p:pRg st="7" end="7"/>
-                                            </p:txEl>
-                                          </p:spTgt>
-                                        </p:tgtEl>
-                                        <p:attrNameLst>
-                                          <p:attrName>style.visibility</p:attrName>
-                                        </p:attrNameLst>
-                                      </p:cBhvr>
-                                      <p:to>
-                                        <p:strVal val="visible"/>
-                                      </p:to>
-                                    </p:set>
-                                  </p:childTnLst>
-                                </p:cTn>
-                              </p:par>
-                            </p:childTnLst>
-                          </p:cTn>
-                        </p:par>
-                      </p:childTnLst>
-                    </p:cTn>
-                  </p:par>
-                  <p:par>
-                    <p:cTn id="27" fill="hold">
-                      <p:stCondLst>
-                        <p:cond delay="indefinite"/>
-                      </p:stCondLst>
-                      <p:childTnLst>
-                        <p:par>
-                          <p:cTn id="28" fill="hold">
-                            <p:stCondLst>
-                              <p:cond delay="0"/>
-                            </p:stCondLst>
-                            <p:childTnLst>
-                              <p:par>
-                                <p:cTn id="29" presetID="1" presetClass="entr" presetSubtype="0" fill="hold" grpId="0" nodeType="clickEffect">
-                                  <p:stCondLst>
-                                    <p:cond delay="0"/>
-                                  </p:stCondLst>
-                                  <p:childTnLst>
-                                    <p:set>
-                                      <p:cBhvr>
-                                        <p:cTn id="30" dur="1" fill="hold">
-                                          <p:stCondLst>
-                                            <p:cond delay="0"/>
-                                          </p:stCondLst>
-                                        </p:cTn>
-                                        <p:tgtEl>
-                                          <p:spTgt spid="2">
-                                            <p:txEl>
-                                              <p:pRg st="8" end="8"/>
-                                            </p:txEl>
-                                          </p:spTgt>
-                                        </p:tgtEl>
-                                        <p:attrNameLst>
-                                          <p:attrName>style.visibility</p:attrName>
-                                        </p:attrNameLst>
-                                      </p:cBhvr>
-                                      <p:to>
-                                        <p:strVal val="visible"/>
-                                      </p:to>
-                                    </p:set>
-                                  </p:childTnLst>
-                                </p:cTn>
-                              </p:par>
-                            </p:childTnLst>
-                          </p:cTn>
-                        </p:par>
-                      </p:childTnLst>
-                    </p:cTn>
-                  </p:par>
-                  <p:par>
-                    <p:cTn id="31" fill="hold">
-                      <p:stCondLst>
-                        <p:cond delay="indefinite"/>
-                      </p:stCondLst>
-                      <p:childTnLst>
-                        <p:par>
-                          <p:cTn id="32" fill="hold">
-                            <p:stCondLst>
-                              <p:cond delay="0"/>
-                            </p:stCondLst>
-                            <p:childTnLst>
-                              <p:par>
-                                <p:cTn id="33" presetID="1" presetClass="entr" presetSubtype="0" fill="hold" grpId="0" nodeType="clickEffect">
-                                  <p:stCondLst>
-                                    <p:cond delay="0"/>
-                                  </p:stCondLst>
-                                  <p:childTnLst>
-                                    <p:set>
-                                      <p:cBhvr>
-                                        <p:cTn id="34" dur="1" fill="hold">
-                                          <p:stCondLst>
-                                            <p:cond delay="0"/>
-                                          </p:stCondLst>
-                                        </p:cTn>
-                                        <p:tgtEl>
-                                          <p:spTgt spid="2">
-                                            <p:txEl>
-                                              <p:pRg st="9" end="9"/>
-                                            </p:txEl>
-                                          </p:spTgt>
-                                        </p:tgtEl>
-                                        <p:attrNameLst>
-                                          <p:attrName>style.visibility</p:attrName>
-                                        </p:attrNameLst>
-                                      </p:cBhvr>
-                                      <p:to>
-                                        <p:strVal val="visible"/>
-                                      </p:to>
-                                    </p:set>
-                                  </p:childTnLst>
-                                </p:cTn>
-                              </p:par>
-                            </p:childTnLst>
-                          </p:cTn>
-                        </p:par>
-                      </p:childTnLst>
-                    </p:cTn>
-                  </p:par>
-                  <p:par>
-                    <p:cTn id="35" fill="hold">
-                      <p:stCondLst>
-                        <p:cond delay="indefinite"/>
-                      </p:stCondLst>
-                      <p:childTnLst>
-                        <p:par>
-                          <p:cTn id="36" fill="hold">
-                            <p:stCondLst>
-                              <p:cond delay="0"/>
-                            </p:stCondLst>
-                            <p:childTnLst>
-                              <p:par>
-                                <p:cTn id="37" presetID="1" presetClass="entr" presetSubtype="0" fill="hold" grpId="0" nodeType="clickEffect">
-                                  <p:stCondLst>
-                                    <p:cond delay="0"/>
-                                  </p:stCondLst>
-                                  <p:childTnLst>
-                                    <p:set>
-                                      <p:cBhvr>
-                                        <p:cTn id="38" dur="1" fill="hold">
-                                          <p:stCondLst>
-                                            <p:cond delay="0"/>
-                                          </p:stCondLst>
-                                        </p:cTn>
-                                        <p:tgtEl>
                                           <p:spTgt spid="6"/>
                                         </p:tgtEl>
                                         <p:attrNameLst>
@@ -9281,7 +7492,6 @@
       </p:par>
     </p:tnLst>
     <p:bldLst>
-      <p:bldP spid="2" grpId="0" uiExpand="1" build="p"/>
       <p:bldP spid="6" grpId="0" animBg="1"/>
     </p:bldLst>
   </p:timing>
@@ -10769,7 +8979,13 @@
                       <a:rPr lang="de-DE" b="0" i="1" smtClean="0">
                         <a:latin typeface="Cambria Math" panose="02040503050406030204" pitchFamily="18" charset="0"/>
                       </a:rPr>
-                      <m:t>=8</m:t>
+                      <m:t>=</m:t>
+                    </m:r>
+                    <m:r>
+                      <a:rPr lang="de-DE" b="0" i="1" smtClean="0">
+                        <a:latin typeface="Cambria Math" panose="02040503050406030204" pitchFamily="18" charset="0"/>
+                      </a:rPr>
+                      <m:t>8</m:t>
                     </m:r>
                   </m:oMath>
                 </a14:m>
@@ -10809,7 +9025,13 @@
                       <a:rPr lang="de-DE" b="0" i="1" smtClean="0">
                         <a:latin typeface="Cambria Math" panose="02040503050406030204" pitchFamily="18" charset="0"/>
                       </a:rPr>
-                      <m:t>=3</m:t>
+                      <m:t>=</m:t>
+                    </m:r>
+                    <m:r>
+                      <a:rPr lang="de-DE" b="0" i="1" smtClean="0">
+                        <a:latin typeface="Cambria Math" panose="02040503050406030204" pitchFamily="18" charset="0"/>
+                      </a:rPr>
+                      <m:t>3</m:t>
                     </m:r>
                   </m:oMath>
                 </a14:m>
@@ -11006,8 +9228,8 @@
           </a:prstGeom>
         </p:spPr>
       </p:pic>
-      <mc:AlternateContent xmlns:mc="http://schemas.openxmlformats.org/markup-compatibility/2006" xmlns:a14="http://schemas.microsoft.com/office/drawing/2010/main">
-        <mc:Choice Requires="a14">
+      <mc:AlternateContent xmlns:mc="http://schemas.openxmlformats.org/markup-compatibility/2006">
+        <mc:Choice xmlns:a14="http://schemas.microsoft.com/office/drawing/2010/main" Requires="a14">
           <p:sp>
             <p:nvSpPr>
               <p:cNvPr id="10" name="TextBox 9">
@@ -11057,7 +9279,13 @@
                         <a:rPr lang="de-DE" sz="1400" b="0" i="1" smtClean="0">
                           <a:latin typeface="Cambria Math" panose="02040503050406030204" pitchFamily="18" charset="0"/>
                         </a:rPr>
-                        <m:t>=3</m:t>
+                        <m:t>=</m:t>
+                      </m:r>
+                      <m:r>
+                        <a:rPr lang="de-DE" sz="1400" b="0" i="1" smtClean="0">
+                          <a:latin typeface="Cambria Math" panose="02040503050406030204" pitchFamily="18" charset="0"/>
+                        </a:rPr>
+                        <m:t>8</m:t>
                       </m:r>
                     </m:oMath>
                   </m:oMathPara>
@@ -11069,7 +9297,7 @@
             </p:txBody>
           </p:sp>
         </mc:Choice>
-        <mc:Fallback xmlns="">
+        <mc:Fallback>
           <p:sp>
             <p:nvSpPr>
               <p:cNvPr id="10" name="TextBox 9">
@@ -11104,7 +9332,7 @@
               <a:lstStyle/>
               <a:p>
                 <a:r>
-                  <a:rPr lang="en-US">
+                  <a:rPr lang="de-DE">
                     <a:noFill/>
                   </a:rPr>
                   <a:t> </a:t>
@@ -11114,8 +9342,8 @@
           </p:sp>
         </mc:Fallback>
       </mc:AlternateContent>
-      <mc:AlternateContent xmlns:mc="http://schemas.openxmlformats.org/markup-compatibility/2006" xmlns:a14="http://schemas.microsoft.com/office/drawing/2010/main">
-        <mc:Choice Requires="a14">
+      <mc:AlternateContent xmlns:mc="http://schemas.openxmlformats.org/markup-compatibility/2006">
+        <mc:Choice xmlns:a14="http://schemas.microsoft.com/office/drawing/2010/main" Requires="a14">
           <p:sp>
             <p:nvSpPr>
               <p:cNvPr id="11" name="TextBox 10">
@@ -11165,7 +9393,13 @@
                         <a:rPr lang="de-DE" sz="1400" b="0" i="1" smtClean="0">
                           <a:latin typeface="Cambria Math" panose="02040503050406030204" pitchFamily="18" charset="0"/>
                         </a:rPr>
-                        <m:t>=8</m:t>
+                        <m:t>=</m:t>
+                      </m:r>
+                      <m:r>
+                        <a:rPr lang="de-DE" sz="1400" b="0" i="1" smtClean="0">
+                          <a:latin typeface="Cambria Math" panose="02040503050406030204" pitchFamily="18" charset="0"/>
+                        </a:rPr>
+                        <m:t>3</m:t>
                       </m:r>
                     </m:oMath>
                   </m:oMathPara>
@@ -11177,7 +9411,7 @@
             </p:txBody>
           </p:sp>
         </mc:Choice>
-        <mc:Fallback xmlns="">
+        <mc:Fallback>
           <p:sp>
             <p:nvSpPr>
               <p:cNvPr id="11" name="TextBox 10">
@@ -11212,7 +9446,7 @@
               <a:lstStyle/>
               <a:p>
                 <a:r>
-                  <a:rPr lang="en-US">
+                  <a:rPr lang="de-DE">
                     <a:noFill/>
                   </a:rPr>
                   <a:t> </a:t>

</xml_diff>